<commit_message>
presentación con link repositorio
</commit_message>
<xml_diff>
--- a/Presentacion/REDES2_2S2020_P1_GRUPO7.pptx
+++ b/Presentacion/REDES2_2S2020_P1_GRUPO7.pptx
@@ -1,62 +1,46 @@
 
 <file path=ppt/presentation.xml><?xml version="1.0" encoding="utf-8"?>
-<p:presentation xmlns:a="http://schemas.openxmlformats.org/drawingml/2006/main" xmlns:r="http://schemas.openxmlformats.org/officeDocument/2006/relationships" xmlns:p="http://schemas.openxmlformats.org/presentationml/2006/main" saveSubsetFonts="1" embedTrueTypeFonts="true">
+<p:presentation xmlns:a="http://schemas.openxmlformats.org/drawingml/2006/main" xmlns:r="http://schemas.openxmlformats.org/officeDocument/2006/relationships" xmlns:p="http://schemas.openxmlformats.org/presentationml/2006/main" embedTrueTypeFonts="1" saveSubsetFonts="1">
   <p:sldMasterIdLst>
     <p:sldMasterId id="2147483648" r:id="rId1"/>
   </p:sldMasterIdLst>
   <p:sldIdLst>
-    <p:sldId id="256" r:id="rId16"/>
-    <p:sldId id="257" r:id="rId17"/>
-    <p:sldId id="258" r:id="rId18"/>
-    <p:sldId id="259" r:id="rId19"/>
-    <p:sldId id="260" r:id="rId20"/>
-    <p:sldId id="261" r:id="rId21"/>
-    <p:sldId id="262" r:id="rId22"/>
-    <p:sldId id="263" r:id="rId23"/>
-    <p:sldId id="264" r:id="rId24"/>
+    <p:sldId id="256" r:id="rId2"/>
+    <p:sldId id="257" r:id="rId3"/>
+    <p:sldId id="258" r:id="rId4"/>
+    <p:sldId id="259" r:id="rId5"/>
+    <p:sldId id="260" r:id="rId6"/>
+    <p:sldId id="261" r:id="rId7"/>
+    <p:sldId id="262" r:id="rId8"/>
+    <p:sldId id="263" r:id="rId9"/>
+    <p:sldId id="264" r:id="rId10"/>
+    <p:sldId id="265" r:id="rId11"/>
   </p:sldIdLst>
   <p:sldSz cx="18288000" cy="10287000"/>
   <p:notesSz cx="6858000" cy="9144000"/>
   <p:embeddedFontLst>
     <p:embeddedFont>
-      <p:font typeface="Montserrat Classic" charset="1" panose="00000500000000000000"/>
-      <p:regular r:id="rId6"/>
+      <p:font typeface="Calibri" panose="020F0502020204030204" pitchFamily="34" charset="0"/>
+      <p:regular r:id="rId12"/>
+      <p:bold r:id="rId13"/>
+      <p:italic r:id="rId14"/>
+      <p:boldItalic r:id="rId15"/>
     </p:embeddedFont>
     <p:embeddedFont>
-      <p:font typeface="Montserrat Classic Bold" charset="1" panose="00000800000000000000"/>
-      <p:regular r:id="rId7"/>
+      <p:font typeface="Montserrat Classic" panose="020B0604020202020204" charset="0"/>
+      <p:regular r:id="rId16"/>
     </p:embeddedFont>
     <p:embeddedFont>
-      <p:font typeface="Arimo" charset="1" panose="020B0604020202020204"/>
-      <p:regular r:id="rId8"/>
+      <p:font typeface="Montserrat Classic Bold" panose="020B0604020202020204" charset="0"/>
+      <p:regular r:id="rId17"/>
     </p:embeddedFont>
     <p:embeddedFont>
-      <p:font typeface="Arimo Bold" charset="1" panose="020B0704020202020204"/>
-      <p:regular r:id="rId9"/>
+      <p:font typeface="Montserrat Light" panose="020B0604020202020204" charset="0"/>
+      <p:regular r:id="rId18"/>
     </p:embeddedFont>
     <p:embeddedFont>
-      <p:font typeface="Arimo Italics" charset="1" panose="020B0604020202090204"/>
-      <p:regular r:id="rId10"/>
-    </p:embeddedFont>
-    <p:embeddedFont>
-      <p:font typeface="Arimo Bold Italics" charset="1" panose="020B0704020202090204"/>
-      <p:regular r:id="rId11"/>
-    </p:embeddedFont>
-    <p:embeddedFont>
-      <p:font typeface="Montserrat Light" charset="1" panose="00000400000000000000"/>
-      <p:regular r:id="rId12"/>
-    </p:embeddedFont>
-    <p:embeddedFont>
-      <p:font typeface="Montserrat Light Bold" charset="1" panose="00000800000000000000"/>
-      <p:regular r:id="rId13"/>
-    </p:embeddedFont>
-    <p:embeddedFont>
-      <p:font typeface="Montserrat Light Italics" charset="1" panose="00000400000000000000"/>
-      <p:regular r:id="rId14"/>
-    </p:embeddedFont>
-    <p:embeddedFont>
-      <p:font typeface="Montserrat Light Bold Italics" charset="1" panose="00000800000000000000"/>
-      <p:regular r:id="rId15"/>
+      <p:font typeface="Montserrat Light Bold" panose="020B0604020202020204" charset="0"/>
+      <p:regular r:id="rId19"/>
     </p:embeddedFont>
   </p:embeddedFontLst>
   <p:defaultTextStyle>
@@ -154,6 +138,22 @@
       </a:defRPr>
     </a:lvl9pPr>
   </p:defaultTextStyle>
+  <p:extLst>
+    <p:ext uri="{EFAFB233-063F-42B5-8137-9DF3F51BA10A}">
+      <p15:sldGuideLst xmlns:p15="http://schemas.microsoft.com/office/powerpoint/2012/main">
+        <p15:guide id="1" orient="horz" pos="2160">
+          <p15:clr>
+            <a:srgbClr val="A4A3A4"/>
+          </p15:clr>
+        </p15:guide>
+        <p15:guide id="2" pos="2880">
+          <p15:clr>
+            <a:srgbClr val="A4A3A4"/>
+          </p15:clr>
+        </p15:guide>
+      </p15:sldGuideLst>
+    </p:ext>
+  </p:extLst>
 </p:presentation>
 </file>
 
@@ -195,10 +195,9 @@
           <a:lstStyle/>
           <a:p>
             <a:r>
-              <a:rPr lang="en-US" smtClean="0"/>
+              <a:rPr lang="en-US"/>
               <a:t>Click to edit Master title style</a:t>
             </a:r>
-            <a:endParaRPr lang="en-US"/>
           </a:p>
         </p:txBody>
       </p:sp>
@@ -314,10 +313,9 @@
           </a:lstStyle>
           <a:p>
             <a:r>
-              <a:rPr lang="en-US" smtClean="0"/>
+              <a:rPr lang="en-US"/>
               <a:t>Click to edit Master subtitle style</a:t>
             </a:r>
-            <a:endParaRPr lang="en-US"/>
           </a:p>
         </p:txBody>
       </p:sp>
@@ -339,7 +337,7 @@
             <a:fld id="{1D8BD707-D9CF-40AE-B4C6-C98DA3205C09}" type="datetimeFigureOut">
               <a:rPr lang="en-US" smtClean="0"/>
               <a:pPr/>
-              <a:t>8/1/2011</a:t>
+              <a:t>10/9/2020</a:t>
             </a:fld>
             <a:endParaRPr lang="en-US"/>
           </a:p>
@@ -382,7 +380,7 @@
             <a:fld id="{B6F15528-21DE-4FAA-801E-634DDDAF4B2B}" type="slidenum">
               <a:rPr lang="en-US" smtClean="0"/>
               <a:pPr/>
-              <a:t>‹#›</a:t>
+              <a:t>‹Nº›</a:t>
             </a:fld>
             <a:endParaRPr lang="en-US"/>
           </a:p>
@@ -429,10 +427,9 @@
           <a:lstStyle/>
           <a:p>
             <a:r>
-              <a:rPr lang="en-US" smtClean="0"/>
+              <a:rPr lang="en-US"/>
               <a:t>Click to edit Master title style</a:t>
             </a:r>
-            <a:endParaRPr lang="en-US"/>
           </a:p>
         </p:txBody>
       </p:sp>
@@ -453,38 +450,37 @@
           <a:p>
             <a:pPr lvl="0"/>
             <a:r>
-              <a:rPr lang="en-US" smtClean="0"/>
+              <a:rPr lang="en-US"/>
               <a:t>Click to edit Master text styles</a:t>
             </a:r>
           </a:p>
           <a:p>
             <a:pPr lvl="1"/>
             <a:r>
-              <a:rPr lang="en-US" smtClean="0"/>
+              <a:rPr lang="en-US"/>
               <a:t>Second level</a:t>
             </a:r>
           </a:p>
           <a:p>
             <a:pPr lvl="2"/>
             <a:r>
-              <a:rPr lang="en-US" smtClean="0"/>
+              <a:rPr lang="en-US"/>
               <a:t>Third level</a:t>
             </a:r>
           </a:p>
           <a:p>
             <a:pPr lvl="3"/>
             <a:r>
-              <a:rPr lang="en-US" smtClean="0"/>
+              <a:rPr lang="en-US"/>
               <a:t>Fourth level</a:t>
             </a:r>
           </a:p>
           <a:p>
             <a:pPr lvl="4"/>
             <a:r>
-              <a:rPr lang="en-US" smtClean="0"/>
+              <a:rPr lang="en-US"/>
               <a:t>Fifth level</a:t>
             </a:r>
-            <a:endParaRPr lang="en-US"/>
           </a:p>
         </p:txBody>
       </p:sp>
@@ -506,7 +502,7 @@
             <a:fld id="{1D8BD707-D9CF-40AE-B4C6-C98DA3205C09}" type="datetimeFigureOut">
               <a:rPr lang="en-US" smtClean="0"/>
               <a:pPr/>
-              <a:t>8/1/2011</a:t>
+              <a:t>10/9/2020</a:t>
             </a:fld>
             <a:endParaRPr lang="en-US"/>
           </a:p>
@@ -549,7 +545,7 @@
             <a:fld id="{B6F15528-21DE-4FAA-801E-634DDDAF4B2B}" type="slidenum">
               <a:rPr lang="en-US" smtClean="0"/>
               <a:pPr/>
-              <a:t>‹#›</a:t>
+              <a:t>‹Nº›</a:t>
             </a:fld>
             <a:endParaRPr lang="en-US"/>
           </a:p>
@@ -601,10 +597,9 @@
           <a:lstStyle/>
           <a:p>
             <a:r>
-              <a:rPr lang="en-US" smtClean="0"/>
+              <a:rPr lang="en-US"/>
               <a:t>Click to edit Master title style</a:t>
             </a:r>
-            <a:endParaRPr lang="en-US"/>
           </a:p>
         </p:txBody>
       </p:sp>
@@ -630,38 +625,37 @@
           <a:p>
             <a:pPr lvl="0"/>
             <a:r>
-              <a:rPr lang="en-US" smtClean="0"/>
+              <a:rPr lang="en-US"/>
               <a:t>Click to edit Master text styles</a:t>
             </a:r>
           </a:p>
           <a:p>
             <a:pPr lvl="1"/>
             <a:r>
-              <a:rPr lang="en-US" smtClean="0"/>
+              <a:rPr lang="en-US"/>
               <a:t>Second level</a:t>
             </a:r>
           </a:p>
           <a:p>
             <a:pPr lvl="2"/>
             <a:r>
-              <a:rPr lang="en-US" smtClean="0"/>
+              <a:rPr lang="en-US"/>
               <a:t>Third level</a:t>
             </a:r>
           </a:p>
           <a:p>
             <a:pPr lvl="3"/>
             <a:r>
-              <a:rPr lang="en-US" smtClean="0"/>
+              <a:rPr lang="en-US"/>
               <a:t>Fourth level</a:t>
             </a:r>
           </a:p>
           <a:p>
             <a:pPr lvl="4"/>
             <a:r>
-              <a:rPr lang="en-US" smtClean="0"/>
+              <a:rPr lang="en-US"/>
               <a:t>Fifth level</a:t>
             </a:r>
-            <a:endParaRPr lang="en-US"/>
           </a:p>
         </p:txBody>
       </p:sp>
@@ -683,7 +677,7 @@
             <a:fld id="{1D8BD707-D9CF-40AE-B4C6-C98DA3205C09}" type="datetimeFigureOut">
               <a:rPr lang="en-US" smtClean="0"/>
               <a:pPr/>
-              <a:t>8/1/2011</a:t>
+              <a:t>10/9/2020</a:t>
             </a:fld>
             <a:endParaRPr lang="en-US"/>
           </a:p>
@@ -726,7 +720,7 @@
             <a:fld id="{B6F15528-21DE-4FAA-801E-634DDDAF4B2B}" type="slidenum">
               <a:rPr lang="en-US" smtClean="0"/>
               <a:pPr/>
-              <a:t>‹#›</a:t>
+              <a:t>‹Nº›</a:t>
             </a:fld>
             <a:endParaRPr lang="en-US"/>
           </a:p>
@@ -773,10 +767,9 @@
           <a:lstStyle/>
           <a:p>
             <a:r>
-              <a:rPr lang="en-US" smtClean="0"/>
+              <a:rPr lang="en-US"/>
               <a:t>Click to edit Master title style</a:t>
             </a:r>
-            <a:endParaRPr lang="en-US"/>
           </a:p>
         </p:txBody>
       </p:sp>
@@ -797,38 +790,37 @@
           <a:p>
             <a:pPr lvl="0"/>
             <a:r>
-              <a:rPr lang="en-US" smtClean="0"/>
+              <a:rPr lang="en-US"/>
               <a:t>Click to edit Master text styles</a:t>
             </a:r>
           </a:p>
           <a:p>
             <a:pPr lvl="1"/>
             <a:r>
-              <a:rPr lang="en-US" smtClean="0"/>
+              <a:rPr lang="en-US"/>
               <a:t>Second level</a:t>
             </a:r>
           </a:p>
           <a:p>
             <a:pPr lvl="2"/>
             <a:r>
-              <a:rPr lang="en-US" smtClean="0"/>
+              <a:rPr lang="en-US"/>
               <a:t>Third level</a:t>
             </a:r>
           </a:p>
           <a:p>
             <a:pPr lvl="3"/>
             <a:r>
-              <a:rPr lang="en-US" smtClean="0"/>
+              <a:rPr lang="en-US"/>
               <a:t>Fourth level</a:t>
             </a:r>
           </a:p>
           <a:p>
             <a:pPr lvl="4"/>
             <a:r>
-              <a:rPr lang="en-US" smtClean="0"/>
+              <a:rPr lang="en-US"/>
               <a:t>Fifth level</a:t>
             </a:r>
-            <a:endParaRPr lang="en-US"/>
           </a:p>
         </p:txBody>
       </p:sp>
@@ -850,7 +842,7 @@
             <a:fld id="{1D8BD707-D9CF-40AE-B4C6-C98DA3205C09}" type="datetimeFigureOut">
               <a:rPr lang="en-US" smtClean="0"/>
               <a:pPr/>
-              <a:t>8/1/2011</a:t>
+              <a:t>10/9/2020</a:t>
             </a:fld>
             <a:endParaRPr lang="en-US"/>
           </a:p>
@@ -893,7 +885,7 @@
             <a:fld id="{B6F15528-21DE-4FAA-801E-634DDDAF4B2B}" type="slidenum">
               <a:rPr lang="en-US" smtClean="0"/>
               <a:pPr/>
-              <a:t>‹#›</a:t>
+              <a:t>‹Nº›</a:t>
             </a:fld>
             <a:endParaRPr lang="en-US"/>
           </a:p>
@@ -949,10 +941,9 @@
           </a:lstStyle>
           <a:p>
             <a:r>
-              <a:rPr lang="en-US" smtClean="0"/>
+              <a:rPr lang="en-US"/>
               <a:t>Click to edit Master title style</a:t>
             </a:r>
-            <a:endParaRPr lang="en-US"/>
           </a:p>
         </p:txBody>
       </p:sp>
@@ -1069,7 +1060,7 @@
           <a:p>
             <a:pPr lvl="0"/>
             <a:r>
-              <a:rPr lang="en-US" smtClean="0"/>
+              <a:rPr lang="en-US"/>
               <a:t>Click to edit Master text styles</a:t>
             </a:r>
           </a:p>
@@ -1093,7 +1084,7 @@
             <a:fld id="{1D8BD707-D9CF-40AE-B4C6-C98DA3205C09}" type="datetimeFigureOut">
               <a:rPr lang="en-US" smtClean="0"/>
               <a:pPr/>
-              <a:t>8/1/2011</a:t>
+              <a:t>10/9/2020</a:t>
             </a:fld>
             <a:endParaRPr lang="en-US"/>
           </a:p>
@@ -1136,7 +1127,7 @@
             <a:fld id="{B6F15528-21DE-4FAA-801E-634DDDAF4B2B}" type="slidenum">
               <a:rPr lang="en-US" smtClean="0"/>
               <a:pPr/>
-              <a:t>‹#›</a:t>
+              <a:t>‹Nº›</a:t>
             </a:fld>
             <a:endParaRPr lang="en-US"/>
           </a:p>
@@ -1183,10 +1174,9 @@
           <a:lstStyle/>
           <a:p>
             <a:r>
-              <a:rPr lang="en-US" smtClean="0"/>
+              <a:rPr lang="en-US"/>
               <a:t>Click to edit Master title style</a:t>
             </a:r>
-            <a:endParaRPr lang="en-US"/>
           </a:p>
         </p:txBody>
       </p:sp>
@@ -1240,38 +1230,37 @@
           <a:p>
             <a:pPr lvl="0"/>
             <a:r>
-              <a:rPr lang="en-US" smtClean="0"/>
+              <a:rPr lang="en-US"/>
               <a:t>Click to edit Master text styles</a:t>
             </a:r>
           </a:p>
           <a:p>
             <a:pPr lvl="1"/>
             <a:r>
-              <a:rPr lang="en-US" smtClean="0"/>
+              <a:rPr lang="en-US"/>
               <a:t>Second level</a:t>
             </a:r>
           </a:p>
           <a:p>
             <a:pPr lvl="2"/>
             <a:r>
-              <a:rPr lang="en-US" smtClean="0"/>
+              <a:rPr lang="en-US"/>
               <a:t>Third level</a:t>
             </a:r>
           </a:p>
           <a:p>
             <a:pPr lvl="3"/>
             <a:r>
-              <a:rPr lang="en-US" smtClean="0"/>
+              <a:rPr lang="en-US"/>
               <a:t>Fourth level</a:t>
             </a:r>
           </a:p>
           <a:p>
             <a:pPr lvl="4"/>
             <a:r>
-              <a:rPr lang="en-US" smtClean="0"/>
+              <a:rPr lang="en-US"/>
               <a:t>Fifth level</a:t>
             </a:r>
-            <a:endParaRPr lang="en-US"/>
           </a:p>
         </p:txBody>
       </p:sp>
@@ -1325,38 +1314,37 @@
           <a:p>
             <a:pPr lvl="0"/>
             <a:r>
-              <a:rPr lang="en-US" smtClean="0"/>
+              <a:rPr lang="en-US"/>
               <a:t>Click to edit Master text styles</a:t>
             </a:r>
           </a:p>
           <a:p>
             <a:pPr lvl="1"/>
             <a:r>
-              <a:rPr lang="en-US" smtClean="0"/>
+              <a:rPr lang="en-US"/>
               <a:t>Second level</a:t>
             </a:r>
           </a:p>
           <a:p>
             <a:pPr lvl="2"/>
             <a:r>
-              <a:rPr lang="en-US" smtClean="0"/>
+              <a:rPr lang="en-US"/>
               <a:t>Third level</a:t>
             </a:r>
           </a:p>
           <a:p>
             <a:pPr lvl="3"/>
             <a:r>
-              <a:rPr lang="en-US" smtClean="0"/>
+              <a:rPr lang="en-US"/>
               <a:t>Fourth level</a:t>
             </a:r>
           </a:p>
           <a:p>
             <a:pPr lvl="4"/>
             <a:r>
-              <a:rPr lang="en-US" smtClean="0"/>
+              <a:rPr lang="en-US"/>
               <a:t>Fifth level</a:t>
             </a:r>
-            <a:endParaRPr lang="en-US"/>
           </a:p>
         </p:txBody>
       </p:sp>
@@ -1378,7 +1366,7 @@
             <a:fld id="{1D8BD707-D9CF-40AE-B4C6-C98DA3205C09}" type="datetimeFigureOut">
               <a:rPr lang="en-US" smtClean="0"/>
               <a:pPr/>
-              <a:t>8/1/2011</a:t>
+              <a:t>10/9/2020</a:t>
             </a:fld>
             <a:endParaRPr lang="en-US"/>
           </a:p>
@@ -1421,7 +1409,7 @@
             <a:fld id="{B6F15528-21DE-4FAA-801E-634DDDAF4B2B}" type="slidenum">
               <a:rPr lang="en-US" smtClean="0"/>
               <a:pPr/>
-              <a:t>‹#›</a:t>
+              <a:t>‹Nº›</a:t>
             </a:fld>
             <a:endParaRPr lang="en-US"/>
           </a:p>
@@ -1472,10 +1460,9 @@
           </a:lstStyle>
           <a:p>
             <a:r>
-              <a:rPr lang="en-US" smtClean="0"/>
+              <a:rPr lang="en-US"/>
               <a:t>Click to edit Master title style</a:t>
             </a:r>
-            <a:endParaRPr lang="en-US"/>
           </a:p>
         </p:txBody>
       </p:sp>
@@ -1538,7 +1525,7 @@
           <a:p>
             <a:pPr lvl="0"/>
             <a:r>
-              <a:rPr lang="en-US" smtClean="0"/>
+              <a:rPr lang="en-US"/>
               <a:t>Click to edit Master text styles</a:t>
             </a:r>
           </a:p>
@@ -1594,38 +1581,37 @@
           <a:p>
             <a:pPr lvl="0"/>
             <a:r>
-              <a:rPr lang="en-US" smtClean="0"/>
+              <a:rPr lang="en-US"/>
               <a:t>Click to edit Master text styles</a:t>
             </a:r>
           </a:p>
           <a:p>
             <a:pPr lvl="1"/>
             <a:r>
-              <a:rPr lang="en-US" smtClean="0"/>
+              <a:rPr lang="en-US"/>
               <a:t>Second level</a:t>
             </a:r>
           </a:p>
           <a:p>
             <a:pPr lvl="2"/>
             <a:r>
-              <a:rPr lang="en-US" smtClean="0"/>
+              <a:rPr lang="en-US"/>
               <a:t>Third level</a:t>
             </a:r>
           </a:p>
           <a:p>
             <a:pPr lvl="3"/>
             <a:r>
-              <a:rPr lang="en-US" smtClean="0"/>
+              <a:rPr lang="en-US"/>
               <a:t>Fourth level</a:t>
             </a:r>
           </a:p>
           <a:p>
             <a:pPr lvl="4"/>
             <a:r>
-              <a:rPr lang="en-US" smtClean="0"/>
+              <a:rPr lang="en-US"/>
               <a:t>Fifth level</a:t>
             </a:r>
-            <a:endParaRPr lang="en-US"/>
           </a:p>
         </p:txBody>
       </p:sp>
@@ -1688,7 +1674,7 @@
           <a:p>
             <a:pPr lvl="0"/>
             <a:r>
-              <a:rPr lang="en-US" smtClean="0"/>
+              <a:rPr lang="en-US"/>
               <a:t>Click to edit Master text styles</a:t>
             </a:r>
           </a:p>
@@ -1744,38 +1730,37 @@
           <a:p>
             <a:pPr lvl="0"/>
             <a:r>
-              <a:rPr lang="en-US" smtClean="0"/>
+              <a:rPr lang="en-US"/>
               <a:t>Click to edit Master text styles</a:t>
             </a:r>
           </a:p>
           <a:p>
             <a:pPr lvl="1"/>
             <a:r>
-              <a:rPr lang="en-US" smtClean="0"/>
+              <a:rPr lang="en-US"/>
               <a:t>Second level</a:t>
             </a:r>
           </a:p>
           <a:p>
             <a:pPr lvl="2"/>
             <a:r>
-              <a:rPr lang="en-US" smtClean="0"/>
+              <a:rPr lang="en-US"/>
               <a:t>Third level</a:t>
             </a:r>
           </a:p>
           <a:p>
             <a:pPr lvl="3"/>
             <a:r>
-              <a:rPr lang="en-US" smtClean="0"/>
+              <a:rPr lang="en-US"/>
               <a:t>Fourth level</a:t>
             </a:r>
           </a:p>
           <a:p>
             <a:pPr lvl="4"/>
             <a:r>
-              <a:rPr lang="en-US" smtClean="0"/>
+              <a:rPr lang="en-US"/>
               <a:t>Fifth level</a:t>
             </a:r>
-            <a:endParaRPr lang="en-US"/>
           </a:p>
         </p:txBody>
       </p:sp>
@@ -1797,7 +1782,7 @@
             <a:fld id="{1D8BD707-D9CF-40AE-B4C6-C98DA3205C09}" type="datetimeFigureOut">
               <a:rPr lang="en-US" smtClean="0"/>
               <a:pPr/>
-              <a:t>8/1/2011</a:t>
+              <a:t>10/9/2020</a:t>
             </a:fld>
             <a:endParaRPr lang="en-US"/>
           </a:p>
@@ -1840,7 +1825,7 @@
             <a:fld id="{B6F15528-21DE-4FAA-801E-634DDDAF4B2B}" type="slidenum">
               <a:rPr lang="en-US" smtClean="0"/>
               <a:pPr/>
-              <a:t>‹#›</a:t>
+              <a:t>‹Nº›</a:t>
             </a:fld>
             <a:endParaRPr lang="en-US"/>
           </a:p>
@@ -1887,10 +1872,9 @@
           <a:lstStyle/>
           <a:p>
             <a:r>
-              <a:rPr lang="en-US" smtClean="0"/>
+              <a:rPr lang="en-US"/>
               <a:t>Click to edit Master title style</a:t>
             </a:r>
-            <a:endParaRPr lang="en-US"/>
           </a:p>
         </p:txBody>
       </p:sp>
@@ -1912,7 +1896,7 @@
             <a:fld id="{1D8BD707-D9CF-40AE-B4C6-C98DA3205C09}" type="datetimeFigureOut">
               <a:rPr lang="en-US" smtClean="0"/>
               <a:pPr/>
-              <a:t>8/1/2011</a:t>
+              <a:t>10/9/2020</a:t>
             </a:fld>
             <a:endParaRPr lang="en-US"/>
           </a:p>
@@ -1955,7 +1939,7 @@
             <a:fld id="{B6F15528-21DE-4FAA-801E-634DDDAF4B2B}" type="slidenum">
               <a:rPr lang="en-US" smtClean="0"/>
               <a:pPr/>
-              <a:t>‹#›</a:t>
+              <a:t>‹Nº›</a:t>
             </a:fld>
             <a:endParaRPr lang="en-US"/>
           </a:p>
@@ -2004,7 +1988,7 @@
             <a:fld id="{1D8BD707-D9CF-40AE-B4C6-C98DA3205C09}" type="datetimeFigureOut">
               <a:rPr lang="en-US" smtClean="0"/>
               <a:pPr/>
-              <a:t>8/1/2011</a:t>
+              <a:t>10/9/2020</a:t>
             </a:fld>
             <a:endParaRPr lang="en-US"/>
           </a:p>
@@ -2047,7 +2031,7 @@
             <a:fld id="{B6F15528-21DE-4FAA-801E-634DDDAF4B2B}" type="slidenum">
               <a:rPr lang="en-US" smtClean="0"/>
               <a:pPr/>
-              <a:t>‹#›</a:t>
+              <a:t>‹Nº›</a:t>
             </a:fld>
             <a:endParaRPr lang="en-US"/>
           </a:p>
@@ -2103,10 +2087,9 @@
           </a:lstStyle>
           <a:p>
             <a:r>
-              <a:rPr lang="en-US" smtClean="0"/>
+              <a:rPr lang="en-US"/>
               <a:t>Click to edit Master title style</a:t>
             </a:r>
-            <a:endParaRPr lang="en-US"/>
           </a:p>
         </p:txBody>
       </p:sp>
@@ -2160,38 +2143,37 @@
           <a:p>
             <a:pPr lvl="0"/>
             <a:r>
-              <a:rPr lang="en-US" smtClean="0"/>
+              <a:rPr lang="en-US"/>
               <a:t>Click to edit Master text styles</a:t>
             </a:r>
           </a:p>
           <a:p>
             <a:pPr lvl="1"/>
             <a:r>
-              <a:rPr lang="en-US" smtClean="0"/>
+              <a:rPr lang="en-US"/>
               <a:t>Second level</a:t>
             </a:r>
           </a:p>
           <a:p>
             <a:pPr lvl="2"/>
             <a:r>
-              <a:rPr lang="en-US" smtClean="0"/>
+              <a:rPr lang="en-US"/>
               <a:t>Third level</a:t>
             </a:r>
           </a:p>
           <a:p>
             <a:pPr lvl="3"/>
             <a:r>
-              <a:rPr lang="en-US" smtClean="0"/>
+              <a:rPr lang="en-US"/>
               <a:t>Fourth level</a:t>
             </a:r>
           </a:p>
           <a:p>
             <a:pPr lvl="4"/>
             <a:r>
-              <a:rPr lang="en-US" smtClean="0"/>
+              <a:rPr lang="en-US"/>
               <a:t>Fifth level</a:t>
             </a:r>
-            <a:endParaRPr lang="en-US"/>
           </a:p>
         </p:txBody>
       </p:sp>
@@ -2254,7 +2236,7 @@
           <a:p>
             <a:pPr lvl="0"/>
             <a:r>
-              <a:rPr lang="en-US" smtClean="0"/>
+              <a:rPr lang="en-US"/>
               <a:t>Click to edit Master text styles</a:t>
             </a:r>
           </a:p>
@@ -2278,7 +2260,7 @@
             <a:fld id="{1D8BD707-D9CF-40AE-B4C6-C98DA3205C09}" type="datetimeFigureOut">
               <a:rPr lang="en-US" smtClean="0"/>
               <a:pPr/>
-              <a:t>8/1/2011</a:t>
+              <a:t>10/9/2020</a:t>
             </a:fld>
             <a:endParaRPr lang="en-US"/>
           </a:p>
@@ -2321,7 +2303,7 @@
             <a:fld id="{B6F15528-21DE-4FAA-801E-634DDDAF4B2B}" type="slidenum">
               <a:rPr lang="en-US" smtClean="0"/>
               <a:pPr/>
-              <a:t>‹#›</a:t>
+              <a:t>‹Nº›</a:t>
             </a:fld>
             <a:endParaRPr lang="en-US"/>
           </a:p>
@@ -2377,10 +2359,9 @@
           </a:lstStyle>
           <a:p>
             <a:r>
-              <a:rPr lang="en-US" smtClean="0"/>
+              <a:rPr lang="en-US"/>
               <a:t>Click to edit Master title style</a:t>
             </a:r>
-            <a:endParaRPr lang="en-US"/>
           </a:p>
         </p:txBody>
       </p:sp>
@@ -2504,7 +2485,7 @@
           <a:p>
             <a:pPr lvl="0"/>
             <a:r>
-              <a:rPr lang="en-US" smtClean="0"/>
+              <a:rPr lang="en-US"/>
               <a:t>Click to edit Master text styles</a:t>
             </a:r>
           </a:p>
@@ -2528,7 +2509,7 @@
             <a:fld id="{1D8BD707-D9CF-40AE-B4C6-C98DA3205C09}" type="datetimeFigureOut">
               <a:rPr lang="en-US" smtClean="0"/>
               <a:pPr/>
-              <a:t>8/1/2011</a:t>
+              <a:t>10/9/2020</a:t>
             </a:fld>
             <a:endParaRPr lang="en-US"/>
           </a:p>
@@ -2571,7 +2552,7 @@
             <a:fld id="{B6F15528-21DE-4FAA-801E-634DDDAF4B2B}" type="slidenum">
               <a:rPr lang="en-US" smtClean="0"/>
               <a:pPr/>
-              <a:t>‹#›</a:t>
+              <a:t>‹Nº›</a:t>
             </a:fld>
             <a:endParaRPr lang="en-US"/>
           </a:p>
@@ -2633,10 +2614,9 @@
           <a:lstStyle/>
           <a:p>
             <a:r>
-              <a:rPr lang="en-US" smtClean="0"/>
+              <a:rPr lang="en-US"/>
               <a:t>Click to edit Master title style</a:t>
             </a:r>
-            <a:endParaRPr lang="en-US"/>
           </a:p>
         </p:txBody>
       </p:sp>
@@ -2667,38 +2647,37 @@
           <a:p>
             <a:pPr lvl="0"/>
             <a:r>
-              <a:rPr lang="en-US" smtClean="0"/>
+              <a:rPr lang="en-US"/>
               <a:t>Click to edit Master text styles</a:t>
             </a:r>
           </a:p>
           <a:p>
             <a:pPr lvl="1"/>
             <a:r>
-              <a:rPr lang="en-US" smtClean="0"/>
+              <a:rPr lang="en-US"/>
               <a:t>Second level</a:t>
             </a:r>
           </a:p>
           <a:p>
             <a:pPr lvl="2"/>
             <a:r>
-              <a:rPr lang="en-US" smtClean="0"/>
+              <a:rPr lang="en-US"/>
               <a:t>Third level</a:t>
             </a:r>
           </a:p>
           <a:p>
             <a:pPr lvl="3"/>
             <a:r>
-              <a:rPr lang="en-US" smtClean="0"/>
+              <a:rPr lang="en-US"/>
               <a:t>Fourth level</a:t>
             </a:r>
           </a:p>
           <a:p>
             <a:pPr lvl="4"/>
             <a:r>
-              <a:rPr lang="en-US" smtClean="0"/>
+              <a:rPr lang="en-US"/>
               <a:t>Fifth level</a:t>
             </a:r>
-            <a:endParaRPr lang="en-US"/>
           </a:p>
         </p:txBody>
       </p:sp>
@@ -2738,7 +2717,7 @@
             <a:fld id="{1D8BD707-D9CF-40AE-B4C6-C98DA3205C09}" type="datetimeFigureOut">
               <a:rPr lang="en-US" smtClean="0"/>
               <a:pPr/>
-              <a:t>8/1/2011</a:t>
+              <a:t>10/9/2020</a:t>
             </a:fld>
             <a:endParaRPr lang="en-US"/>
           </a:p>
@@ -2817,7 +2796,7 @@
             <a:fld id="{B6F15528-21DE-4FAA-801E-634DDDAF4B2B}" type="slidenum">
               <a:rPr lang="en-US" smtClean="0"/>
               <a:pPr/>
-              <a:t>‹#›</a:t>
+              <a:t>‹Nº›</a:t>
             </a:fld>
             <a:endParaRPr lang="en-US"/>
           </a:p>
@@ -3093,13 +3072,14 @@
 </file>
 
 <file path=ppt/slides/slide1.xml><?xml version="1.0" encoding="utf-8"?>
-<p:sld xmlns:p="http://schemas.openxmlformats.org/presentationml/2006/main" xmlns:a="http://schemas.openxmlformats.org/drawingml/2006/main" xmlns:r="http://schemas.openxmlformats.org/officeDocument/2006/relationships">
+<p:sld xmlns:a="http://schemas.openxmlformats.org/drawingml/2006/main" xmlns:r="http://schemas.openxmlformats.org/officeDocument/2006/relationships" xmlns:p="http://schemas.openxmlformats.org/presentationml/2006/main">
   <p:cSld>
     <p:bg>
       <p:bgPr>
         <a:solidFill>
           <a:srgbClr val="1E3D58"/>
         </a:solidFill>
+        <a:effectLst/>
       </p:bgPr>
     </p:bg>
     <p:spTree>
@@ -3118,21 +3098,21 @@
       </p:grpSpPr>
       <p:pic>
         <p:nvPicPr>
-          <p:cNvPr name="Picture 2" id="2"/>
+          <p:cNvPr id="2" name="Picture 2"/>
           <p:cNvPicPr>
-            <a:picLocks noChangeAspect="true"/>
+            <a:picLocks noChangeAspect="1"/>
           </p:cNvPicPr>
           <p:nvPr/>
         </p:nvPicPr>
         <p:blipFill>
           <a:blip r:embed="rId2"/>
-          <a:srcRect l="27814" t="32426" r="50567" b="0"/>
+          <a:srcRect l="27814" t="32426" r="50567"/>
           <a:stretch>
             <a:fillRect/>
           </a:stretch>
         </p:blipFill>
         <p:spPr>
-          <a:xfrm flipH="false" flipV="false" rot="0">
+          <a:xfrm>
             <a:off x="-433730" y="-330005"/>
             <a:ext cx="2458198" cy="10938119"/>
           </a:xfrm>
@@ -3143,12 +3123,12 @@
       </p:pic>
       <p:sp>
         <p:nvSpPr>
-          <p:cNvPr name="AutoShape 3" id="3"/>
+          <p:cNvPr id="3" name="AutoShape 3"/>
           <p:cNvSpPr/>
           <p:nvPr/>
         </p:nvSpPr>
         <p:spPr>
-          <a:xfrm rot="0">
+          <a:xfrm>
             <a:off x="-1147731" y="-438150"/>
             <a:ext cx="2552700" cy="11163300"/>
           </a:xfrm>
@@ -3162,12 +3142,12 @@
       </p:sp>
       <p:sp>
         <p:nvSpPr>
-          <p:cNvPr name="TextBox 4" id="4"/>
-          <p:cNvSpPr txBox="true"/>
+          <p:cNvPr id="4" name="TextBox 4"/>
+          <p:cNvSpPr txBox="1"/>
           <p:nvPr/>
         </p:nvSpPr>
         <p:spPr>
-          <a:xfrm rot="0">
+          <a:xfrm>
             <a:off x="2368079" y="971550"/>
             <a:ext cx="8290762" cy="539750"/>
           </a:xfrm>
@@ -3176,7 +3156,7 @@
           </a:prstGeom>
         </p:spPr>
         <p:txBody>
-          <a:bodyPr anchor="t" rtlCol="false" tIns="0" lIns="0" bIns="0" rIns="0">
+          <a:bodyPr lIns="0" tIns="0" rIns="0" bIns="0" rtlCol="0" anchor="t">
             <a:spAutoFit/>
           </a:bodyPr>
           <a:lstStyle/>
@@ -3200,12 +3180,12 @@
       </p:sp>
       <p:grpSp>
         <p:nvGrpSpPr>
-          <p:cNvPr name="Group 5" id="5"/>
+          <p:cNvPr id="5" name="Group 5"/>
           <p:cNvGrpSpPr/>
           <p:nvPr/>
         </p:nvGrpSpPr>
         <p:grpSpPr>
-          <a:xfrm rot="0">
+          <a:xfrm>
             <a:off x="2368079" y="6875694"/>
             <a:ext cx="15173906" cy="2382606"/>
             <a:chOff x="0" y="0"/>
@@ -3214,12 +3194,12 @@
         </p:grpSpPr>
         <p:sp>
           <p:nvSpPr>
-            <p:cNvPr name="TextBox 6" id="6"/>
-            <p:cNvSpPr txBox="true"/>
+            <p:cNvPr id="6" name="TextBox 6"/>
+            <p:cNvSpPr txBox="1"/>
             <p:nvPr/>
           </p:nvSpPr>
           <p:spPr>
-            <a:xfrm rot="0">
+            <a:xfrm>
               <a:off x="0" y="123825"/>
               <a:ext cx="20231875" cy="2101215"/>
             </a:xfrm>
@@ -3228,7 +3208,7 @@
             </a:prstGeom>
           </p:spPr>
           <p:txBody>
-            <a:bodyPr anchor="t" rtlCol="false" tIns="0" lIns="0" bIns="0" rIns="0">
+            <a:bodyPr lIns="0" tIns="0" rIns="0" bIns="0" rtlCol="0" anchor="t">
               <a:spAutoFit/>
             </a:bodyPr>
             <a:lstStyle/>
@@ -3245,28 +3225,19 @@
                   </a:solidFill>
                   <a:latin typeface="Montserrat Classic Bold"/>
                 </a:rPr>
-                <a:t>R</a:t>
-              </a:r>
-              <a:r>
-                <a:rPr lang="en-US" sz="11000" spc="770">
-                  <a:solidFill>
-                    <a:srgbClr val="E8EEF1"/>
-                  </a:solidFill>
-                  <a:latin typeface="Montserrat Classic Bold"/>
-                </a:rPr>
-                <a:t>ED DE GENOVIA</a:t>
+                <a:t>RED DE GENOVIA</a:t>
               </a:r>
             </a:p>
           </p:txBody>
         </p:sp>
         <p:sp>
           <p:nvSpPr>
-            <p:cNvPr name="TextBox 7" id="7"/>
-            <p:cNvSpPr txBox="true"/>
+            <p:cNvPr id="7" name="TextBox 7"/>
+            <p:cNvSpPr txBox="1"/>
             <p:nvPr/>
           </p:nvSpPr>
           <p:spPr>
-            <a:xfrm rot="0">
+            <a:xfrm>
               <a:off x="0" y="2554085"/>
               <a:ext cx="11054351" cy="622723"/>
             </a:xfrm>
@@ -3275,7 +3246,7 @@
             </a:prstGeom>
           </p:spPr>
           <p:txBody>
-            <a:bodyPr anchor="t" rtlCol="false" tIns="0" lIns="0" bIns="0" rIns="0">
+            <a:bodyPr lIns="0" tIns="0" rIns="0" bIns="0" rtlCol="0" anchor="t">
               <a:spAutoFit/>
             </a:bodyPr>
             <a:lstStyle/>
@@ -3300,12 +3271,12 @@
       </p:grpSp>
       <p:grpSp>
         <p:nvGrpSpPr>
-          <p:cNvPr name="Group 8" id="8"/>
+          <p:cNvPr id="8" name="Group 8"/>
           <p:cNvGrpSpPr/>
           <p:nvPr/>
         </p:nvGrpSpPr>
         <p:grpSpPr>
-          <a:xfrm rot="0">
+          <a:xfrm>
             <a:off x="1221635" y="2030517"/>
             <a:ext cx="2886906" cy="851395"/>
             <a:chOff x="0" y="0"/>
@@ -3314,7 +3285,7 @@
         </p:grpSpPr>
         <p:sp>
           <p:nvSpPr>
-            <p:cNvPr name="Freeform 9" id="9"/>
+            <p:cNvPr id="9" name="Freeform 9"/>
             <p:cNvSpPr/>
             <p:nvPr/>
           </p:nvSpPr>
@@ -3328,9 +3299,9 @@
               <a:gdLst/>
               <a:ahLst/>
               <a:cxnLst/>
-              <a:rect r="r" b="b" t="t" l="l"/>
+              <a:rect l="l" t="t" r="r" b="b"/>
               <a:pathLst>
-                <a:path h="408940" w="1722525">
+                <a:path w="1722525" h="408940">
                   <a:moveTo>
                     <a:pt x="1516785" y="0"/>
                   </a:moveTo>
@@ -3381,14 +3352,15 @@
 </p:sld>
 </file>
 
-<file path=ppt/slides/slide2.xml><?xml version="1.0" encoding="utf-8"?>
-<p:sld xmlns:p="http://schemas.openxmlformats.org/presentationml/2006/main" xmlns:a="http://schemas.openxmlformats.org/drawingml/2006/main">
+<file path=ppt/slides/slide10.xml><?xml version="1.0" encoding="utf-8"?>
+<p:sld xmlns:a="http://schemas.openxmlformats.org/drawingml/2006/main" xmlns:r="http://schemas.openxmlformats.org/officeDocument/2006/relationships" xmlns:p="http://schemas.openxmlformats.org/presentationml/2006/main">
   <p:cSld>
     <p:bg>
       <p:bgPr>
         <a:solidFill>
           <a:srgbClr val="1E3D58"/>
         </a:solidFill>
+        <a:effectLst/>
       </p:bgPr>
     </p:bg>
     <p:spTree>
@@ -3407,12 +3379,327 @@
       </p:grpSpPr>
       <p:grpSp>
         <p:nvGrpSpPr>
-          <p:cNvPr name="Group 2" id="2"/>
+          <p:cNvPr id="2" name="Group 2"/>
           <p:cNvGrpSpPr/>
           <p:nvPr/>
         </p:nvGrpSpPr>
         <p:grpSpPr>
-          <a:xfrm rot="0">
+          <a:xfrm>
+            <a:off x="0" y="8832603"/>
+            <a:ext cx="2886906" cy="851395"/>
+            <a:chOff x="0" y="0"/>
+            <a:chExt cx="1722525" cy="508000"/>
+          </a:xfrm>
+        </p:grpSpPr>
+        <p:sp>
+          <p:nvSpPr>
+            <p:cNvPr id="3" name="Freeform 3"/>
+            <p:cNvSpPr/>
+            <p:nvPr/>
+          </p:nvSpPr>
+          <p:spPr>
+            <a:xfrm>
+              <a:off x="0" y="49530"/>
+              <a:ext cx="1722525" cy="408940"/>
+            </a:xfrm>
+            <a:custGeom>
+              <a:avLst/>
+              <a:gdLst/>
+              <a:ahLst/>
+              <a:cxnLst/>
+              <a:rect l="l" t="t" r="r" b="b"/>
+              <a:pathLst>
+                <a:path w="1722525" h="408940">
+                  <a:moveTo>
+                    <a:pt x="1516785" y="0"/>
+                  </a:moveTo>
+                  <a:cubicBezTo>
+                    <a:pt x="1416455" y="0"/>
+                    <a:pt x="1333905" y="72390"/>
+                    <a:pt x="1314855" y="166370"/>
+                  </a:cubicBezTo>
+                  <a:lnTo>
+                    <a:pt x="0" y="166370"/>
+                  </a:lnTo>
+                  <a:lnTo>
+                    <a:pt x="0" y="242570"/>
+                  </a:lnTo>
+                  <a:lnTo>
+                    <a:pt x="1316125" y="242570"/>
+                  </a:lnTo>
+                  <a:cubicBezTo>
+                    <a:pt x="1333905" y="337820"/>
+                    <a:pt x="1417725" y="408940"/>
+                    <a:pt x="1518055" y="408940"/>
+                  </a:cubicBezTo>
+                  <a:cubicBezTo>
+                    <a:pt x="1631085" y="408940"/>
+                    <a:pt x="1722525" y="317500"/>
+                    <a:pt x="1722525" y="204470"/>
+                  </a:cubicBezTo>
+                  <a:cubicBezTo>
+                    <a:pt x="1722525" y="91440"/>
+                    <a:pt x="1631085" y="0"/>
+                    <a:pt x="1516785" y="0"/>
+                  </a:cubicBezTo>
+                  <a:close/>
+                </a:path>
+              </a:pathLst>
+            </a:custGeom>
+            <a:solidFill>
+              <a:srgbClr val="43B0F1"/>
+            </a:solidFill>
+          </p:spPr>
+        </p:sp>
+      </p:grpSp>
+      <p:grpSp>
+        <p:nvGrpSpPr>
+          <p:cNvPr id="4" name="Group 4"/>
+          <p:cNvGrpSpPr/>
+          <p:nvPr/>
+        </p:nvGrpSpPr>
+        <p:grpSpPr>
+          <a:xfrm rot="-10800000">
+            <a:off x="15401094" y="603003"/>
+            <a:ext cx="2886906" cy="851395"/>
+            <a:chOff x="0" y="0"/>
+            <a:chExt cx="1722525" cy="508000"/>
+          </a:xfrm>
+        </p:grpSpPr>
+        <p:sp>
+          <p:nvSpPr>
+            <p:cNvPr id="5" name="Freeform 5"/>
+            <p:cNvSpPr/>
+            <p:nvPr/>
+          </p:nvSpPr>
+          <p:spPr>
+            <a:xfrm>
+              <a:off x="0" y="49530"/>
+              <a:ext cx="1722525" cy="408940"/>
+            </a:xfrm>
+            <a:custGeom>
+              <a:avLst/>
+              <a:gdLst/>
+              <a:ahLst/>
+              <a:cxnLst/>
+              <a:rect l="l" t="t" r="r" b="b"/>
+              <a:pathLst>
+                <a:path w="1722525" h="408940">
+                  <a:moveTo>
+                    <a:pt x="1516785" y="0"/>
+                  </a:moveTo>
+                  <a:cubicBezTo>
+                    <a:pt x="1416455" y="0"/>
+                    <a:pt x="1333905" y="72390"/>
+                    <a:pt x="1314855" y="166370"/>
+                  </a:cubicBezTo>
+                  <a:lnTo>
+                    <a:pt x="0" y="166370"/>
+                  </a:lnTo>
+                  <a:lnTo>
+                    <a:pt x="0" y="242570"/>
+                  </a:lnTo>
+                  <a:lnTo>
+                    <a:pt x="1316125" y="242570"/>
+                  </a:lnTo>
+                  <a:cubicBezTo>
+                    <a:pt x="1333905" y="337820"/>
+                    <a:pt x="1417725" y="408940"/>
+                    <a:pt x="1518055" y="408940"/>
+                  </a:cubicBezTo>
+                  <a:cubicBezTo>
+                    <a:pt x="1631085" y="408940"/>
+                    <a:pt x="1722525" y="317500"/>
+                    <a:pt x="1722525" y="204470"/>
+                  </a:cubicBezTo>
+                  <a:cubicBezTo>
+                    <a:pt x="1722525" y="91440"/>
+                    <a:pt x="1631085" y="0"/>
+                    <a:pt x="1516785" y="0"/>
+                  </a:cubicBezTo>
+                  <a:close/>
+                </a:path>
+              </a:pathLst>
+            </a:custGeom>
+            <a:solidFill>
+              <a:srgbClr val="43B0F1"/>
+            </a:solidFill>
+          </p:spPr>
+        </p:sp>
+      </p:grpSp>
+      <p:grpSp>
+        <p:nvGrpSpPr>
+          <p:cNvPr id="7" name="Group 7"/>
+          <p:cNvGrpSpPr/>
+          <p:nvPr/>
+        </p:nvGrpSpPr>
+        <p:grpSpPr>
+          <a:xfrm>
+            <a:off x="1251372" y="978694"/>
+            <a:ext cx="11538658" cy="1625423"/>
+            <a:chOff x="0" y="-66675"/>
+            <a:chExt cx="15384877" cy="2167232"/>
+          </a:xfrm>
+        </p:grpSpPr>
+        <p:sp>
+          <p:nvSpPr>
+            <p:cNvPr id="8" name="TextBox 8"/>
+            <p:cNvSpPr txBox="1"/>
+            <p:nvPr/>
+          </p:nvSpPr>
+          <p:spPr>
+            <a:xfrm>
+              <a:off x="0" y="-66675"/>
+              <a:ext cx="15384877" cy="1105774"/>
+            </a:xfrm>
+            <a:prstGeom prst="rect">
+              <a:avLst/>
+            </a:prstGeom>
+          </p:spPr>
+          <p:txBody>
+            <a:bodyPr lIns="0" tIns="0" rIns="0" bIns="0" rtlCol="0" anchor="t">
+              <a:spAutoFit/>
+            </a:bodyPr>
+            <a:lstStyle/>
+            <a:p>
+              <a:pPr>
+                <a:lnSpc>
+                  <a:spcPts val="7205"/>
+                </a:lnSpc>
+              </a:pPr>
+              <a:r>
+                <a:rPr lang="en-US" sz="5500" spc="159" dirty="0">
+                  <a:solidFill>
+                    <a:srgbClr val="E8EEF1"/>
+                  </a:solidFill>
+                  <a:latin typeface="Montserrat Classic Bold"/>
+                </a:rPr>
+                <a:t>LINK REPOSITORIO</a:t>
+              </a:r>
+            </a:p>
+          </p:txBody>
+        </p:sp>
+        <p:sp>
+          <p:nvSpPr>
+            <p:cNvPr id="9" name="TextBox 9"/>
+            <p:cNvSpPr txBox="1"/>
+            <p:nvPr/>
+          </p:nvSpPr>
+          <p:spPr>
+            <a:xfrm>
+              <a:off x="0" y="1405232"/>
+              <a:ext cx="15384877" cy="695325"/>
+            </a:xfrm>
+            <a:prstGeom prst="rect">
+              <a:avLst/>
+            </a:prstGeom>
+          </p:spPr>
+          <p:txBody>
+            <a:bodyPr lIns="0" tIns="0" rIns="0" bIns="0" rtlCol="0" anchor="t">
+              <a:spAutoFit/>
+            </a:bodyPr>
+            <a:lstStyle/>
+            <a:p>
+              <a:pPr>
+                <a:lnSpc>
+                  <a:spcPts val="4500"/>
+                </a:lnSpc>
+              </a:pPr>
+              <a:endParaRPr lang="en-US" sz="3000" spc="30" dirty="0">
+                <a:solidFill>
+                  <a:srgbClr val="E8EEF1"/>
+                </a:solidFill>
+                <a:latin typeface="Montserrat Light"/>
+              </a:endParaRPr>
+            </a:p>
+          </p:txBody>
+        </p:sp>
+      </p:grpSp>
+      <p:sp>
+        <p:nvSpPr>
+          <p:cNvPr id="11" name="CuadroTexto 10">
+            <a:extLst>
+              <a:ext uri="{FF2B5EF4-FFF2-40B4-BE49-F238E27FC236}">
+                <a16:creationId xmlns:a16="http://schemas.microsoft.com/office/drawing/2014/main" id="{7E81BC76-7D58-4A0F-B1F0-757F69A376BA}"/>
+              </a:ext>
+            </a:extLst>
+          </p:cNvPr>
+          <p:cNvSpPr txBox="1"/>
+          <p:nvPr/>
+        </p:nvSpPr>
+        <p:spPr>
+          <a:xfrm>
+            <a:off x="685800" y="3619500"/>
+            <a:ext cx="16535400" cy="1938992"/>
+          </a:xfrm>
+          <a:prstGeom prst="rect">
+            <a:avLst/>
+          </a:prstGeom>
+          <a:noFill/>
+        </p:spPr>
+        <p:txBody>
+          <a:bodyPr wrap="square">
+            <a:spAutoFit/>
+          </a:bodyPr>
+          <a:lstStyle/>
+          <a:p>
+            <a:r>
+              <a:rPr lang="es-GT" sz="6000" dirty="0">
+                <a:solidFill>
+                  <a:schemeClr val="bg1"/>
+                </a:solidFill>
+              </a:rPr>
+              <a:t>https://github.com/OscarJO/REDES2_2S2020_P1_GRUPO7.git</a:t>
+            </a:r>
+          </a:p>
+        </p:txBody>
+      </p:sp>
+    </p:spTree>
+    <p:extLst>
+      <p:ext uri="{BB962C8B-B14F-4D97-AF65-F5344CB8AC3E}">
+        <p14:creationId xmlns:p14="http://schemas.microsoft.com/office/powerpoint/2010/main" val="158313839"/>
+      </p:ext>
+    </p:extLst>
+  </p:cSld>
+  <p:clrMapOvr>
+    <a:masterClrMapping/>
+  </p:clrMapOvr>
+</p:sld>
+</file>
+
+<file path=ppt/slides/slide2.xml><?xml version="1.0" encoding="utf-8"?>
+<p:sld xmlns:a="http://schemas.openxmlformats.org/drawingml/2006/main" xmlns:r="http://schemas.openxmlformats.org/officeDocument/2006/relationships" xmlns:p="http://schemas.openxmlformats.org/presentationml/2006/main">
+  <p:cSld>
+    <p:bg>
+      <p:bgPr>
+        <a:solidFill>
+          <a:srgbClr val="1E3D58"/>
+        </a:solidFill>
+        <a:effectLst/>
+      </p:bgPr>
+    </p:bg>
+    <p:spTree>
+      <p:nvGrpSpPr>
+        <p:cNvPr id="1" name=""/>
+        <p:cNvGrpSpPr/>
+        <p:nvPr/>
+      </p:nvGrpSpPr>
+      <p:grpSpPr>
+        <a:xfrm>
+          <a:off x="0" y="0"/>
+          <a:ext cx="0" cy="0"/>
+          <a:chOff x="0" y="0"/>
+          <a:chExt cx="0" cy="0"/>
+        </a:xfrm>
+      </p:grpSpPr>
+      <p:grpSp>
+        <p:nvGrpSpPr>
+          <p:cNvPr id="2" name="Group 2"/>
+          <p:cNvGrpSpPr/>
+          <p:nvPr/>
+        </p:nvGrpSpPr>
+        <p:grpSpPr>
+          <a:xfrm>
             <a:off x="3201483" y="3174366"/>
             <a:ext cx="11885035" cy="3938267"/>
             <a:chOff x="0" y="0"/>
@@ -3421,12 +3708,12 @@
         </p:grpSpPr>
         <p:sp>
           <p:nvSpPr>
-            <p:cNvPr name="TextBox 3" id="3"/>
-            <p:cNvSpPr txBox="true"/>
+            <p:cNvPr id="3" name="TextBox 3"/>
+            <p:cNvSpPr txBox="1"/>
             <p:nvPr/>
           </p:nvSpPr>
           <p:spPr>
-            <a:xfrm rot="0">
+            <a:xfrm>
               <a:off x="0" y="-47625"/>
               <a:ext cx="15846713" cy="1382649"/>
             </a:xfrm>
@@ -3435,7 +3722,7 @@
             </a:prstGeom>
           </p:spPr>
           <p:txBody>
-            <a:bodyPr anchor="t" rtlCol="false" tIns="0" lIns="0" bIns="0" rIns="0">
+            <a:bodyPr lIns="0" tIns="0" rIns="0" bIns="0" rtlCol="0" anchor="t">
               <a:spAutoFit/>
             </a:bodyPr>
             <a:lstStyle/>
@@ -3459,12 +3746,12 @@
         </p:sp>
         <p:sp>
           <p:nvSpPr>
-            <p:cNvPr name="TextBox 4" id="4"/>
-            <p:cNvSpPr txBox="true"/>
+            <p:cNvPr id="4" name="TextBox 4"/>
+            <p:cNvSpPr txBox="1"/>
             <p:nvPr/>
           </p:nvSpPr>
           <p:spPr>
-            <a:xfrm rot="0">
+            <a:xfrm>
               <a:off x="619701" y="1778191"/>
               <a:ext cx="14607312" cy="741045"/>
             </a:xfrm>
@@ -3473,7 +3760,7 @@
             </a:prstGeom>
           </p:spPr>
           <p:txBody>
-            <a:bodyPr anchor="t" rtlCol="false" tIns="0" lIns="0" bIns="0" rIns="0">
+            <a:bodyPr lIns="0" tIns="0" rIns="0" bIns="0" rtlCol="0" anchor="t">
               <a:spAutoFit/>
             </a:bodyPr>
             <a:lstStyle/>
@@ -3497,12 +3784,12 @@
         </p:sp>
         <p:sp>
           <p:nvSpPr>
-            <p:cNvPr name="TextBox 5" id="5"/>
-            <p:cNvSpPr txBox="true"/>
+            <p:cNvPr id="5" name="TextBox 5"/>
+            <p:cNvSpPr txBox="1"/>
             <p:nvPr/>
           </p:nvSpPr>
           <p:spPr>
-            <a:xfrm rot="0">
+            <a:xfrm>
               <a:off x="619701" y="3031698"/>
               <a:ext cx="14607312" cy="2219325"/>
             </a:xfrm>
@@ -3511,7 +3798,7 @@
             </a:prstGeom>
           </p:spPr>
           <p:txBody>
-            <a:bodyPr anchor="t" rtlCol="false" tIns="0" lIns="0" bIns="0" rIns="0">
+            <a:bodyPr lIns="0" tIns="0" rIns="0" bIns="0" rtlCol="0" anchor="t">
               <a:spAutoFit/>
             </a:bodyPr>
             <a:lstStyle/>
@@ -3568,12 +3855,12 @@
       </p:grpSp>
       <p:grpSp>
         <p:nvGrpSpPr>
-          <p:cNvPr name="Group 6" id="6"/>
+          <p:cNvPr id="6" name="Group 6"/>
           <p:cNvGrpSpPr/>
           <p:nvPr/>
         </p:nvGrpSpPr>
         <p:grpSpPr>
-          <a:xfrm rot="0">
+          <a:xfrm>
             <a:off x="-675946" y="8832603"/>
             <a:ext cx="2886906" cy="851395"/>
             <a:chOff x="0" y="0"/>
@@ -3582,7 +3869,7 @@
         </p:grpSpPr>
         <p:sp>
           <p:nvSpPr>
-            <p:cNvPr name="Freeform 7" id="7"/>
+            <p:cNvPr id="7" name="Freeform 7"/>
             <p:cNvSpPr/>
             <p:nvPr/>
           </p:nvSpPr>
@@ -3596,9 +3883,9 @@
               <a:gdLst/>
               <a:ahLst/>
               <a:cxnLst/>
-              <a:rect r="r" b="b" t="t" l="l"/>
+              <a:rect l="l" t="t" r="r" b="b"/>
               <a:pathLst>
-                <a:path h="408940" w="1722525">
+                <a:path w="1722525" h="408940">
                   <a:moveTo>
                     <a:pt x="1516785" y="0"/>
                   </a:moveTo>
@@ -3643,7 +3930,7 @@
       </p:grpSp>
       <p:grpSp>
         <p:nvGrpSpPr>
-          <p:cNvPr name="Group 8" id="8"/>
+          <p:cNvPr id="8" name="Group 8"/>
           <p:cNvGrpSpPr/>
           <p:nvPr/>
         </p:nvGrpSpPr>
@@ -3657,7 +3944,7 @@
         </p:grpSpPr>
         <p:sp>
           <p:nvSpPr>
-            <p:cNvPr name="Freeform 9" id="9"/>
+            <p:cNvPr id="9" name="Freeform 9"/>
             <p:cNvSpPr/>
             <p:nvPr/>
           </p:nvSpPr>
@@ -3671,9 +3958,9 @@
               <a:gdLst/>
               <a:ahLst/>
               <a:cxnLst/>
-              <a:rect r="r" b="b" t="t" l="l"/>
+              <a:rect l="l" t="t" r="r" b="b"/>
               <a:pathLst>
-                <a:path h="408940" w="1722525">
+                <a:path w="1722525" h="408940">
                   <a:moveTo>
                     <a:pt x="1516785" y="0"/>
                   </a:moveTo>
@@ -3725,13 +4012,14 @@
 </file>
 
 <file path=ppt/slides/slide3.xml><?xml version="1.0" encoding="utf-8"?>
-<p:sld xmlns:p="http://schemas.openxmlformats.org/presentationml/2006/main" xmlns:a="http://schemas.openxmlformats.org/drawingml/2006/main" xmlns:r="http://schemas.openxmlformats.org/officeDocument/2006/relationships">
+<p:sld xmlns:a="http://schemas.openxmlformats.org/drawingml/2006/main" xmlns:r="http://schemas.openxmlformats.org/officeDocument/2006/relationships" xmlns:p="http://schemas.openxmlformats.org/presentationml/2006/main">
   <p:cSld>
     <p:bg>
       <p:bgPr>
         <a:solidFill>
           <a:srgbClr val="1E3D58"/>
         </a:solidFill>
+        <a:effectLst/>
       </p:bgPr>
     </p:bg>
     <p:spTree>
@@ -3750,21 +4038,21 @@
       </p:grpSpPr>
       <p:pic>
         <p:nvPicPr>
-          <p:cNvPr name="Picture 2" id="2"/>
+          <p:cNvPr id="2" name="Picture 2"/>
           <p:cNvPicPr>
-            <a:picLocks noChangeAspect="true"/>
+            <a:picLocks noChangeAspect="1"/>
           </p:cNvPicPr>
           <p:nvPr/>
         </p:nvPicPr>
         <p:blipFill>
           <a:blip r:embed="rId2"/>
-          <a:srcRect l="27814" t="32426" r="50567" b="0"/>
+          <a:srcRect l="27814" t="32426" r="50567"/>
           <a:stretch>
             <a:fillRect/>
           </a:stretch>
         </p:blipFill>
         <p:spPr>
-          <a:xfrm flipH="false" flipV="false" rot="0">
+          <a:xfrm>
             <a:off x="15338758" y="-254504"/>
             <a:ext cx="2458198" cy="10938119"/>
           </a:xfrm>
@@ -3775,12 +4063,12 @@
       </p:pic>
       <p:grpSp>
         <p:nvGrpSpPr>
-          <p:cNvPr name="Group 3" id="3"/>
+          <p:cNvPr id="3" name="Group 3"/>
           <p:cNvGrpSpPr/>
           <p:nvPr/>
         </p:nvGrpSpPr>
         <p:grpSpPr>
-          <a:xfrm rot="0">
+          <a:xfrm>
             <a:off x="-598165" y="1696532"/>
             <a:ext cx="11008275" cy="8169522"/>
             <a:chOff x="0" y="0"/>
@@ -3789,12 +4077,12 @@
         </p:grpSpPr>
         <p:sp>
           <p:nvSpPr>
-            <p:cNvPr name="TextBox 4" id="4"/>
-            <p:cNvSpPr txBox="true"/>
+            <p:cNvPr id="4" name="TextBox 4"/>
+            <p:cNvSpPr txBox="1"/>
             <p:nvPr/>
           </p:nvSpPr>
           <p:spPr>
-            <a:xfrm rot="0">
+            <a:xfrm>
               <a:off x="2425262" y="1784048"/>
               <a:ext cx="12252439" cy="1382649"/>
             </a:xfrm>
@@ -3803,7 +4091,7 @@
             </a:prstGeom>
           </p:spPr>
           <p:txBody>
-            <a:bodyPr anchor="t" rtlCol="false" tIns="0" lIns="0" bIns="0" rIns="0">
+            <a:bodyPr lIns="0" tIns="0" rIns="0" bIns="0" rtlCol="0" anchor="t">
               <a:spAutoFit/>
             </a:bodyPr>
             <a:lstStyle/>
@@ -3827,12 +4115,12 @@
         </p:sp>
         <p:sp>
           <p:nvSpPr>
-            <p:cNvPr name="TextBox 5" id="5"/>
-            <p:cNvSpPr txBox="true"/>
+            <p:cNvPr id="5" name="TextBox 5"/>
+            <p:cNvSpPr txBox="1"/>
             <p:nvPr/>
           </p:nvSpPr>
           <p:spPr>
-            <a:xfrm rot="0">
+            <a:xfrm>
               <a:off x="2425262" y="3609864"/>
               <a:ext cx="11550113" cy="741045"/>
             </a:xfrm>
@@ -3841,7 +4129,7 @@
             </a:prstGeom>
           </p:spPr>
           <p:txBody>
-            <a:bodyPr anchor="t" rtlCol="false" tIns="0" lIns="0" bIns="0" rIns="0">
+            <a:bodyPr lIns="0" tIns="0" rIns="0" bIns="0" rtlCol="0" anchor="t">
               <a:spAutoFit/>
             </a:bodyPr>
             <a:lstStyle/>
@@ -3865,12 +4153,12 @@
         </p:sp>
         <p:sp>
           <p:nvSpPr>
-            <p:cNvPr name="TextBox 6" id="6"/>
-            <p:cNvSpPr txBox="true"/>
+            <p:cNvPr id="6" name="TextBox 6"/>
+            <p:cNvSpPr txBox="1"/>
             <p:nvPr/>
           </p:nvSpPr>
           <p:spPr>
-            <a:xfrm rot="0">
+            <a:xfrm>
               <a:off x="2425262" y="4863372"/>
               <a:ext cx="11550113" cy="6029325"/>
             </a:xfrm>
@@ -3879,7 +4167,7 @@
             </a:prstGeom>
           </p:spPr>
           <p:txBody>
-            <a:bodyPr anchor="t" rtlCol="false" tIns="0" lIns="0" bIns="0" rIns="0">
+            <a:bodyPr lIns="0" tIns="0" rIns="0" bIns="0" rtlCol="0" anchor="t">
               <a:spAutoFit/>
             </a:bodyPr>
             <a:lstStyle/>
@@ -3896,16 +4184,7 @@
                   </a:solidFill>
                   <a:latin typeface="Montserrat Light"/>
                 </a:rPr>
-                <a:t>Se</a:t>
-              </a:r>
-              <a:r>
-                <a:rPr lang="en-US" sz="3000" spc="30">
-                  <a:solidFill>
-                    <a:srgbClr val="E8EEF1"/>
-                  </a:solidFill>
-                  <a:latin typeface="Montserrat Light"/>
-                </a:rPr>
-                <a:t> utiliza una arquitectura HUB AND SPOKE siendo uno de los mejores patrones arquitectónicos para la integración de datos. La transferencia de datos y la comunicación entre servidores viajan a través de un hub</a:t>
+                <a:t>Se utiliza una arquitectura HUB AND SPOKE siendo uno de los mejores patrones arquitectónicos para la integración de datos. La transferencia de datos y la comunicación entre servidores viajan a través de un hub</a:t>
               </a:r>
             </a:p>
             <a:p>
@@ -3928,12 +4207,12 @@
         </p:sp>
         <p:grpSp>
           <p:nvGrpSpPr>
-            <p:cNvPr name="Group 7" id="7"/>
+            <p:cNvPr id="7" name="Group 7"/>
             <p:cNvGrpSpPr/>
             <p:nvPr/>
           </p:nvGrpSpPr>
           <p:grpSpPr>
-            <a:xfrm rot="0">
+            <a:xfrm>
               <a:off x="0" y="0"/>
               <a:ext cx="3849208" cy="1135193"/>
               <a:chOff x="0" y="0"/>
@@ -3942,7 +4221,7 @@
           </p:grpSpPr>
           <p:sp>
             <p:nvSpPr>
-              <p:cNvPr name="Freeform 8" id="8"/>
+              <p:cNvPr id="8" name="Freeform 8"/>
               <p:cNvSpPr/>
               <p:nvPr/>
             </p:nvSpPr>
@@ -3956,9 +4235,9 @@
                 <a:gdLst/>
                 <a:ahLst/>
                 <a:cxnLst/>
-                <a:rect r="r" b="b" t="t" l="l"/>
+                <a:rect l="l" t="t" r="r" b="b"/>
                 <a:pathLst>
-                  <a:path h="408940" w="1722525">
+                  <a:path w="1722525" h="408940">
                     <a:moveTo>
                       <a:pt x="1516785" y="0"/>
                     </a:moveTo>
@@ -4011,13 +4290,14 @@
 </file>
 
 <file path=ppt/slides/slide4.xml><?xml version="1.0" encoding="utf-8"?>
-<p:sld xmlns:p="http://schemas.openxmlformats.org/presentationml/2006/main" xmlns:a="http://schemas.openxmlformats.org/drawingml/2006/main" xmlns:r="http://schemas.openxmlformats.org/officeDocument/2006/relationships">
+<p:sld xmlns:a="http://schemas.openxmlformats.org/drawingml/2006/main" xmlns:r="http://schemas.openxmlformats.org/officeDocument/2006/relationships" xmlns:p="http://schemas.openxmlformats.org/presentationml/2006/main">
   <p:cSld>
     <p:bg>
       <p:bgPr>
         <a:solidFill>
           <a:srgbClr val="1E3D58"/>
         </a:solidFill>
+        <a:effectLst/>
       </p:bgPr>
     </p:bg>
     <p:spTree>
@@ -4036,21 +4316,21 @@
       </p:grpSpPr>
       <p:pic>
         <p:nvPicPr>
-          <p:cNvPr name="Picture 2" id="2"/>
+          <p:cNvPr id="2" name="Picture 2"/>
           <p:cNvPicPr>
-            <a:picLocks noChangeAspect="true"/>
+            <a:picLocks noChangeAspect="1"/>
           </p:cNvPicPr>
           <p:nvPr/>
         </p:nvPicPr>
         <p:blipFill>
           <a:blip r:embed="rId2"/>
-          <a:srcRect l="27814" t="32426" r="50567" b="0"/>
+          <a:srcRect l="27814" t="32426" r="50567"/>
           <a:stretch>
             <a:fillRect/>
           </a:stretch>
         </p:blipFill>
         <p:spPr>
-          <a:xfrm flipH="false" flipV="false" rot="0">
+          <a:xfrm>
             <a:off x="449906" y="-651119"/>
             <a:ext cx="2458198" cy="10938119"/>
           </a:xfrm>
@@ -4061,12 +4341,12 @@
       </p:pic>
       <p:grpSp>
         <p:nvGrpSpPr>
-          <p:cNvPr name="Group 3" id="3"/>
+          <p:cNvPr id="3" name="Group 3"/>
           <p:cNvGrpSpPr/>
           <p:nvPr/>
         </p:nvGrpSpPr>
         <p:grpSpPr>
-          <a:xfrm rot="0">
+          <a:xfrm>
             <a:off x="3219959" y="1157282"/>
             <a:ext cx="12946983" cy="8313788"/>
             <a:chOff x="0" y="0"/>
@@ -4075,12 +4355,12 @@
         </p:grpSpPr>
         <p:sp>
           <p:nvSpPr>
-            <p:cNvPr name="TextBox 4" id="4"/>
-            <p:cNvSpPr txBox="true"/>
+            <p:cNvPr id="4" name="TextBox 4"/>
+            <p:cNvSpPr txBox="1"/>
             <p:nvPr/>
           </p:nvSpPr>
           <p:spPr>
-            <a:xfrm rot="0">
+            <a:xfrm>
               <a:off x="0" y="-28575"/>
               <a:ext cx="17262644" cy="1001030"/>
             </a:xfrm>
@@ -4089,7 +4369,7 @@
             </a:prstGeom>
           </p:spPr>
           <p:txBody>
-            <a:bodyPr anchor="t" rtlCol="false" tIns="0" lIns="0" bIns="0" rIns="0">
+            <a:bodyPr lIns="0" tIns="0" rIns="0" bIns="0" rtlCol="0" anchor="t">
               <a:spAutoFit/>
             </a:bodyPr>
             <a:lstStyle/>
@@ -4113,12 +4393,12 @@
         </p:sp>
         <p:sp>
           <p:nvSpPr>
-            <p:cNvPr name="TextBox 5" id="5"/>
-            <p:cNvSpPr txBox="true"/>
+            <p:cNvPr id="5" name="TextBox 5"/>
+            <p:cNvSpPr txBox="1"/>
             <p:nvPr/>
           </p:nvSpPr>
           <p:spPr>
-            <a:xfrm rot="0">
+            <a:xfrm>
               <a:off x="0" y="1302204"/>
               <a:ext cx="16273126" cy="532852"/>
             </a:xfrm>
@@ -4127,7 +4407,7 @@
             </a:prstGeom>
           </p:spPr>
           <p:txBody>
-            <a:bodyPr anchor="t" rtlCol="false" tIns="0" lIns="0" bIns="0" rIns="0">
+            <a:bodyPr lIns="0" tIns="0" rIns="0" bIns="0" rtlCol="0" anchor="t">
               <a:spAutoFit/>
             </a:bodyPr>
             <a:lstStyle/>
@@ -4151,12 +4431,12 @@
         </p:sp>
         <p:sp>
           <p:nvSpPr>
-            <p:cNvPr name="TextBox 6" id="6"/>
-            <p:cNvSpPr txBox="true"/>
+            <p:cNvPr id="6" name="TextBox 6"/>
+            <p:cNvSpPr txBox="1"/>
             <p:nvPr/>
           </p:nvSpPr>
           <p:spPr>
-            <a:xfrm rot="0">
+            <a:xfrm>
               <a:off x="0" y="2213637"/>
               <a:ext cx="16273126" cy="8871414"/>
             </a:xfrm>
@@ -4165,7 +4445,7 @@
             </a:prstGeom>
           </p:spPr>
           <p:txBody>
-            <a:bodyPr anchor="t" rtlCol="false" tIns="0" lIns="0" bIns="0" rIns="0">
+            <a:bodyPr lIns="0" tIns="0" rIns="0" bIns="0" rtlCol="0" anchor="t">
               <a:spAutoFit/>
             </a:bodyPr>
             <a:lstStyle/>
@@ -4182,20 +4462,11 @@
                   </a:solidFill>
                   <a:latin typeface="Montserrat Light"/>
                 </a:rPr>
-                <a:t>Se d</a:t>
-              </a:r>
-              <a:r>
-                <a:rPr lang="en-US" sz="2185" spc="21">
-                  <a:solidFill>
-                    <a:srgbClr val="E8EEF1"/>
-                  </a:solidFill>
-                  <a:latin typeface="Montserrat Light"/>
-                </a:rPr>
-                <a:t>efinen tres capas de jerarquía:</a:t>
+                <a:t>Se definen tres capas de jerarquía:</a:t>
               </a:r>
             </a:p>
             <a:p>
-              <a:pPr algn="l" marL="471796" indent="-235898" lvl="1">
+              <a:pPr marL="471796" lvl="1" indent="-235898" algn="l">
                 <a:lnSpc>
                   <a:spcPts val="3277"/>
                 </a:lnSpc>
@@ -4229,7 +4500,7 @@
               </a:r>
             </a:p>
             <a:p>
-              <a:pPr algn="l" marL="471796" indent="-235898" lvl="1">
+              <a:pPr marL="471796" lvl="1" indent="-235898" algn="l">
                 <a:lnSpc>
                   <a:spcPts val="3277"/>
                 </a:lnSpc>
@@ -4263,7 +4534,7 @@
               </a:r>
             </a:p>
             <a:p>
-              <a:pPr algn="l" marL="471796" indent="-235898" lvl="1">
+              <a:pPr marL="471796" lvl="1" indent="-235898" algn="l">
                 <a:lnSpc>
                   <a:spcPts val="3277"/>
                 </a:lnSpc>
@@ -4301,7 +4572,7 @@
       </p:grpSp>
       <p:grpSp>
         <p:nvGrpSpPr>
-          <p:cNvPr name="Group 7" id="7"/>
+          <p:cNvPr id="7" name="Group 7"/>
           <p:cNvGrpSpPr/>
           <p:nvPr/>
         </p:nvGrpSpPr>
@@ -4315,7 +4586,7 @@
         </p:grpSpPr>
         <p:sp>
           <p:nvSpPr>
-            <p:cNvPr name="Freeform 8" id="8"/>
+            <p:cNvPr id="8" name="Freeform 8"/>
             <p:cNvSpPr/>
             <p:nvPr/>
           </p:nvSpPr>
@@ -4329,9 +4600,9 @@
               <a:gdLst/>
               <a:ahLst/>
               <a:cxnLst/>
-              <a:rect r="r" b="b" t="t" l="l"/>
+              <a:rect l="l" t="t" r="r" b="b"/>
               <a:pathLst>
-                <a:path h="408940" w="1722525">
+                <a:path w="1722525" h="408940">
                   <a:moveTo>
                     <a:pt x="1516785" y="0"/>
                   </a:moveTo>
@@ -4383,13 +4654,14 @@
 </file>
 
 <file path=ppt/slides/slide5.xml><?xml version="1.0" encoding="utf-8"?>
-<p:sld xmlns:p="http://schemas.openxmlformats.org/presentationml/2006/main" xmlns:a="http://schemas.openxmlformats.org/drawingml/2006/main" xmlns:r="http://schemas.openxmlformats.org/officeDocument/2006/relationships">
+<p:sld xmlns:a="http://schemas.openxmlformats.org/drawingml/2006/main" xmlns:r="http://schemas.openxmlformats.org/officeDocument/2006/relationships" xmlns:p="http://schemas.openxmlformats.org/presentationml/2006/main">
   <p:cSld>
     <p:bg>
       <p:bgPr>
         <a:solidFill>
           <a:srgbClr val="1E3D58"/>
         </a:solidFill>
+        <a:effectLst/>
       </p:bgPr>
     </p:bg>
     <p:spTree>
@@ -4408,21 +4680,21 @@
       </p:grpSpPr>
       <p:pic>
         <p:nvPicPr>
-          <p:cNvPr name="Picture 2" id="2"/>
+          <p:cNvPr id="2" name="Picture 2"/>
           <p:cNvPicPr>
-            <a:picLocks noChangeAspect="true"/>
+            <a:picLocks noChangeAspect="1"/>
           </p:cNvPicPr>
           <p:nvPr/>
         </p:nvPicPr>
         <p:blipFill>
           <a:blip r:embed="rId2"/>
-          <a:srcRect l="27814" t="32426" r="50567" b="0"/>
+          <a:srcRect l="27814" t="32426" r="50567"/>
           <a:stretch>
             <a:fillRect/>
           </a:stretch>
         </p:blipFill>
         <p:spPr>
-          <a:xfrm flipH="false" flipV="false" rot="0">
+          <a:xfrm>
             <a:off x="15338758" y="-254504"/>
             <a:ext cx="2458198" cy="10938119"/>
           </a:xfrm>
@@ -4433,12 +4705,12 @@
       </p:pic>
       <p:grpSp>
         <p:nvGrpSpPr>
-          <p:cNvPr name="Group 3" id="3"/>
+          <p:cNvPr id="3" name="Group 3"/>
           <p:cNvGrpSpPr/>
           <p:nvPr/>
         </p:nvGrpSpPr>
         <p:grpSpPr>
-          <a:xfrm rot="0">
+          <a:xfrm>
             <a:off x="-576823" y="3261636"/>
             <a:ext cx="11008275" cy="6455022"/>
             <a:chOff x="0" y="0"/>
@@ -4447,12 +4719,12 @@
         </p:grpSpPr>
         <p:sp>
           <p:nvSpPr>
-            <p:cNvPr name="TextBox 4" id="4"/>
-            <p:cNvSpPr txBox="true"/>
+            <p:cNvPr id="4" name="TextBox 4"/>
+            <p:cNvSpPr txBox="1"/>
             <p:nvPr/>
           </p:nvSpPr>
           <p:spPr>
-            <a:xfrm rot="0">
+            <a:xfrm>
               <a:off x="2425262" y="1784048"/>
               <a:ext cx="12252439" cy="1382649"/>
             </a:xfrm>
@@ -4461,7 +4733,7 @@
             </a:prstGeom>
           </p:spPr>
           <p:txBody>
-            <a:bodyPr anchor="t" rtlCol="false" tIns="0" lIns="0" bIns="0" rIns="0">
+            <a:bodyPr lIns="0" tIns="0" rIns="0" bIns="0" rtlCol="0" anchor="t">
               <a:spAutoFit/>
             </a:bodyPr>
             <a:lstStyle/>
@@ -4485,12 +4757,12 @@
         </p:sp>
         <p:sp>
           <p:nvSpPr>
-            <p:cNvPr name="TextBox 5" id="5"/>
-            <p:cNvSpPr txBox="true"/>
+            <p:cNvPr id="5" name="TextBox 5"/>
+            <p:cNvSpPr txBox="1"/>
             <p:nvPr/>
           </p:nvSpPr>
           <p:spPr>
-            <a:xfrm rot="0">
+            <a:xfrm>
               <a:off x="2425262" y="3609864"/>
               <a:ext cx="11550113" cy="741045"/>
             </a:xfrm>
@@ -4499,7 +4771,7 @@
             </a:prstGeom>
           </p:spPr>
           <p:txBody>
-            <a:bodyPr anchor="t" rtlCol="false" tIns="0" lIns="0" bIns="0" rIns="0">
+            <a:bodyPr lIns="0" tIns="0" rIns="0" bIns="0" rtlCol="0" anchor="t">
               <a:spAutoFit/>
             </a:bodyPr>
             <a:lstStyle/>
@@ -4523,12 +4795,12 @@
         </p:sp>
         <p:sp>
           <p:nvSpPr>
-            <p:cNvPr name="TextBox 6" id="6"/>
-            <p:cNvSpPr txBox="true"/>
+            <p:cNvPr id="6" name="TextBox 6"/>
+            <p:cNvSpPr txBox="1"/>
             <p:nvPr/>
           </p:nvSpPr>
           <p:spPr>
-            <a:xfrm rot="0">
+            <a:xfrm>
               <a:off x="2425262" y="4863372"/>
               <a:ext cx="11550113" cy="3743325"/>
             </a:xfrm>
@@ -4537,7 +4809,7 @@
             </a:prstGeom>
           </p:spPr>
           <p:txBody>
-            <a:bodyPr anchor="t" rtlCol="false" tIns="0" lIns="0" bIns="0" rIns="0">
+            <a:bodyPr lIns="0" tIns="0" rIns="0" bIns="0" rtlCol="0" anchor="t">
               <a:spAutoFit/>
             </a:bodyPr>
             <a:lstStyle/>
@@ -4593,12 +4865,12 @@
         </p:sp>
         <p:grpSp>
           <p:nvGrpSpPr>
-            <p:cNvPr name="Group 7" id="7"/>
+            <p:cNvPr id="7" name="Group 7"/>
             <p:cNvGrpSpPr/>
             <p:nvPr/>
           </p:nvGrpSpPr>
           <p:grpSpPr>
-            <a:xfrm rot="0">
+            <a:xfrm>
               <a:off x="0" y="0"/>
               <a:ext cx="3849208" cy="1135193"/>
               <a:chOff x="0" y="0"/>
@@ -4607,7 +4879,7 @@
           </p:grpSpPr>
           <p:sp>
             <p:nvSpPr>
-              <p:cNvPr name="Freeform 8" id="8"/>
+              <p:cNvPr id="8" name="Freeform 8"/>
               <p:cNvSpPr/>
               <p:nvPr/>
             </p:nvSpPr>
@@ -4621,9 +4893,9 @@
                 <a:gdLst/>
                 <a:ahLst/>
                 <a:cxnLst/>
-                <a:rect r="r" b="b" t="t" l="l"/>
+                <a:rect l="l" t="t" r="r" b="b"/>
                 <a:pathLst>
-                  <a:path h="408940" w="1722525">
+                  <a:path w="1722525" h="408940">
                     <a:moveTo>
                       <a:pt x="1516785" y="0"/>
                     </a:moveTo>
@@ -4676,13 +4948,14 @@
 </file>
 
 <file path=ppt/slides/slide6.xml><?xml version="1.0" encoding="utf-8"?>
-<p:sld xmlns:p="http://schemas.openxmlformats.org/presentationml/2006/main" xmlns:a="http://schemas.openxmlformats.org/drawingml/2006/main" xmlns:r="http://schemas.openxmlformats.org/officeDocument/2006/relationships">
+<p:sld xmlns:a="http://schemas.openxmlformats.org/drawingml/2006/main" xmlns:r="http://schemas.openxmlformats.org/officeDocument/2006/relationships" xmlns:p="http://schemas.openxmlformats.org/presentationml/2006/main">
   <p:cSld>
     <p:bg>
       <p:bgPr>
         <a:solidFill>
           <a:srgbClr val="1E3D58"/>
         </a:solidFill>
+        <a:effectLst/>
       </p:bgPr>
     </p:bg>
     <p:spTree>
@@ -4701,21 +4974,21 @@
       </p:grpSpPr>
       <p:pic>
         <p:nvPicPr>
-          <p:cNvPr name="Picture 2" id="2"/>
+          <p:cNvPr id="2" name="Picture 2"/>
           <p:cNvPicPr>
-            <a:picLocks noChangeAspect="true"/>
+            <a:picLocks noChangeAspect="1"/>
           </p:cNvPicPr>
           <p:nvPr/>
         </p:nvPicPr>
         <p:blipFill>
           <a:blip r:embed="rId2"/>
-          <a:srcRect l="31759" t="0" r="51477" b="0"/>
+          <a:srcRect l="31759" r="51477"/>
           <a:stretch>
             <a:fillRect/>
           </a:stretch>
         </p:blipFill>
         <p:spPr>
-          <a:xfrm flipH="false" flipV="false" rot="5400000">
+          <a:xfrm rot="5400000">
             <a:off x="7945886" y="112590"/>
             <a:ext cx="2396228" cy="20348819"/>
           </a:xfrm>
@@ -4726,12 +4999,12 @@
       </p:pic>
       <p:grpSp>
         <p:nvGrpSpPr>
-          <p:cNvPr name="Group 3" id="3"/>
+          <p:cNvPr id="3" name="Group 3"/>
           <p:cNvGrpSpPr/>
           <p:nvPr/>
         </p:nvGrpSpPr>
         <p:grpSpPr>
-          <a:xfrm rot="0">
+          <a:xfrm>
             <a:off x="3084903" y="3516354"/>
             <a:ext cx="12118194" cy="3254291"/>
             <a:chOff x="0" y="0"/>
@@ -4740,12 +5013,12 @@
         </p:grpSpPr>
         <p:sp>
           <p:nvSpPr>
-            <p:cNvPr name="TextBox 4" id="4"/>
-            <p:cNvSpPr txBox="true"/>
+            <p:cNvPr id="4" name="TextBox 4"/>
+            <p:cNvSpPr txBox="1"/>
             <p:nvPr/>
           </p:nvSpPr>
           <p:spPr>
-            <a:xfrm rot="0">
+            <a:xfrm>
               <a:off x="0" y="-47625"/>
               <a:ext cx="16157592" cy="1382649"/>
             </a:xfrm>
@@ -4754,7 +5027,7 @@
             </a:prstGeom>
           </p:spPr>
           <p:txBody>
-            <a:bodyPr anchor="t" rtlCol="false" tIns="0" lIns="0" bIns="0" rIns="0">
+            <a:bodyPr lIns="0" tIns="0" rIns="0" bIns="0" rtlCol="0" anchor="t">
               <a:spAutoFit/>
             </a:bodyPr>
             <a:lstStyle/>
@@ -4778,12 +5051,12 @@
         </p:sp>
         <p:sp>
           <p:nvSpPr>
-            <p:cNvPr name="TextBox 5" id="5"/>
-            <p:cNvSpPr txBox="true"/>
+            <p:cNvPr id="5" name="TextBox 5"/>
+            <p:cNvSpPr txBox="1"/>
             <p:nvPr/>
           </p:nvSpPr>
           <p:spPr>
-            <a:xfrm rot="0">
+            <a:xfrm>
               <a:off x="5357" y="3599661"/>
               <a:ext cx="16146877" cy="739394"/>
             </a:xfrm>
@@ -4792,7 +5065,7 @@
             </a:prstGeom>
           </p:spPr>
           <p:txBody>
-            <a:bodyPr anchor="t" rtlCol="false" tIns="0" lIns="0" bIns="0" rIns="0">
+            <a:bodyPr lIns="0" tIns="0" rIns="0" bIns="0" rtlCol="0" anchor="t">
               <a:spAutoFit/>
             </a:bodyPr>
             <a:lstStyle/>
@@ -4802,17 +5075,18 @@
                   <a:spcPts val="4896"/>
                 </a:lnSpc>
               </a:pPr>
+              <a:endParaRPr/>
             </a:p>
           </p:txBody>
         </p:sp>
         <p:grpSp>
           <p:nvGrpSpPr>
-            <p:cNvPr name="Group 6" id="6"/>
+            <p:cNvPr id="6" name="Group 6"/>
             <p:cNvGrpSpPr/>
             <p:nvPr/>
           </p:nvGrpSpPr>
           <p:grpSpPr>
-            <a:xfrm rot="0">
+            <a:xfrm>
               <a:off x="6910418" y="2062839"/>
               <a:ext cx="2336755" cy="609465"/>
               <a:chOff x="0" y="0"/>
@@ -4821,7 +5095,7 @@
           </p:grpSpPr>
           <p:sp>
             <p:nvSpPr>
-              <p:cNvPr name="Freeform 7" id="7"/>
+              <p:cNvPr id="7" name="Freeform 7"/>
               <p:cNvSpPr/>
               <p:nvPr/>
             </p:nvSpPr>
@@ -4835,9 +5109,9 @@
                 <a:gdLst/>
                 <a:ahLst/>
                 <a:cxnLst/>
-                <a:rect r="r" b="b" t="t" l="l"/>
+                <a:rect l="l" t="t" r="r" b="b"/>
                 <a:pathLst>
-                  <a:path h="408940" w="1947727">
+                  <a:path w="1947727" h="408940">
                     <a:moveTo>
                       <a:pt x="1741987" y="0"/>
                     </a:moveTo>
@@ -4907,13 +5181,14 @@
 </file>
 
 <file path=ppt/slides/slide7.xml><?xml version="1.0" encoding="utf-8"?>
-<p:sld xmlns:p="http://schemas.openxmlformats.org/presentationml/2006/main" xmlns:a="http://schemas.openxmlformats.org/drawingml/2006/main" xmlns:r="http://schemas.openxmlformats.org/officeDocument/2006/relationships">
+<p:sld xmlns:a="http://schemas.openxmlformats.org/drawingml/2006/main" xmlns:r="http://schemas.openxmlformats.org/officeDocument/2006/relationships" xmlns:p="http://schemas.openxmlformats.org/presentationml/2006/main">
   <p:cSld>
     <p:bg>
       <p:bgPr>
         <a:solidFill>
           <a:srgbClr val="1E3D58"/>
         </a:solidFill>
+        <a:effectLst/>
       </p:bgPr>
     </p:bg>
     <p:spTree>
@@ -4932,12 +5207,12 @@
       </p:grpSpPr>
       <p:grpSp>
         <p:nvGrpSpPr>
-          <p:cNvPr name="Group 2" id="2"/>
+          <p:cNvPr id="2" name="Group 2"/>
           <p:cNvGrpSpPr/>
           <p:nvPr/>
         </p:nvGrpSpPr>
         <p:grpSpPr>
-          <a:xfrm rot="0">
+          <a:xfrm>
             <a:off x="0" y="8832603"/>
             <a:ext cx="2886906" cy="851395"/>
             <a:chOff x="0" y="0"/>
@@ -4946,7 +5221,7 @@
         </p:grpSpPr>
         <p:sp>
           <p:nvSpPr>
-            <p:cNvPr name="Freeform 3" id="3"/>
+            <p:cNvPr id="3" name="Freeform 3"/>
             <p:cNvSpPr/>
             <p:nvPr/>
           </p:nvSpPr>
@@ -4960,9 +5235,9 @@
               <a:gdLst/>
               <a:ahLst/>
               <a:cxnLst/>
-              <a:rect r="r" b="b" t="t" l="l"/>
+              <a:rect l="l" t="t" r="r" b="b"/>
               <a:pathLst>
-                <a:path h="408940" w="1722525">
+                <a:path w="1722525" h="408940">
                   <a:moveTo>
                     <a:pt x="1516785" y="0"/>
                   </a:moveTo>
@@ -5007,7 +5282,7 @@
       </p:grpSp>
       <p:grpSp>
         <p:nvGrpSpPr>
-          <p:cNvPr name="Group 4" id="4"/>
+          <p:cNvPr id="4" name="Group 4"/>
           <p:cNvGrpSpPr/>
           <p:nvPr/>
         </p:nvGrpSpPr>
@@ -5021,7 +5296,7 @@
         </p:grpSpPr>
         <p:sp>
           <p:nvSpPr>
-            <p:cNvPr name="Freeform 5" id="5"/>
+            <p:cNvPr id="5" name="Freeform 5"/>
             <p:cNvSpPr/>
             <p:nvPr/>
           </p:nvSpPr>
@@ -5035,9 +5310,9 @@
               <a:gdLst/>
               <a:ahLst/>
               <a:cxnLst/>
-              <a:rect r="r" b="b" t="t" l="l"/>
+              <a:rect l="l" t="t" r="r" b="b"/>
               <a:pathLst>
-                <a:path h="408940" w="1722525">
+                <a:path w="1722525" h="408940">
                   <a:moveTo>
                     <a:pt x="1516785" y="0"/>
                   </a:moveTo>
@@ -5082,21 +5357,21 @@
       </p:grpSp>
       <p:pic>
         <p:nvPicPr>
-          <p:cNvPr name="Picture 6" id="6"/>
+          <p:cNvPr id="6" name="Picture 6"/>
           <p:cNvPicPr>
-            <a:picLocks noChangeAspect="true"/>
+            <a:picLocks noChangeAspect="1"/>
           </p:cNvPicPr>
           <p:nvPr/>
         </p:nvPicPr>
         <p:blipFill>
           <a:blip r:embed="rId2"/>
-          <a:srcRect l="0" t="0" r="0" b="0"/>
+          <a:srcRect/>
           <a:stretch>
             <a:fillRect/>
           </a:stretch>
         </p:blipFill>
         <p:spPr>
-          <a:xfrm flipH="false" flipV="false" rot="0">
+          <a:xfrm>
             <a:off x="1642951" y="4030759"/>
             <a:ext cx="15616349" cy="2890611"/>
           </a:xfrm>
@@ -5107,12 +5382,12 @@
       </p:pic>
       <p:grpSp>
         <p:nvGrpSpPr>
-          <p:cNvPr name="Group 7" id="7"/>
+          <p:cNvPr id="7" name="Group 7"/>
           <p:cNvGrpSpPr/>
           <p:nvPr/>
         </p:nvGrpSpPr>
         <p:grpSpPr>
-          <a:xfrm rot="0">
+          <a:xfrm>
             <a:off x="1251372" y="1028700"/>
             <a:ext cx="11538658" cy="1575417"/>
             <a:chOff x="0" y="0"/>
@@ -5121,12 +5396,12 @@
         </p:grpSpPr>
         <p:sp>
           <p:nvSpPr>
-            <p:cNvPr name="TextBox 8" id="8"/>
-            <p:cNvSpPr txBox="true"/>
+            <p:cNvPr id="8" name="TextBox 8"/>
+            <p:cNvSpPr txBox="1"/>
             <p:nvPr/>
           </p:nvSpPr>
           <p:spPr>
-            <a:xfrm rot="0">
+            <a:xfrm>
               <a:off x="0" y="-66675"/>
               <a:ext cx="15384877" cy="1183428"/>
             </a:xfrm>
@@ -5135,7 +5410,7 @@
             </a:prstGeom>
           </p:spPr>
           <p:txBody>
-            <a:bodyPr anchor="t" rtlCol="false" tIns="0" lIns="0" bIns="0" rIns="0">
+            <a:bodyPr lIns="0" tIns="0" rIns="0" bIns="0" rtlCol="0" anchor="t">
               <a:spAutoFit/>
             </a:bodyPr>
             <a:lstStyle/>
@@ -5159,12 +5434,12 @@
         </p:sp>
         <p:sp>
           <p:nvSpPr>
-            <p:cNvPr name="TextBox 9" id="9"/>
-            <p:cNvSpPr txBox="true"/>
+            <p:cNvPr id="9" name="TextBox 9"/>
+            <p:cNvSpPr txBox="1"/>
             <p:nvPr/>
           </p:nvSpPr>
           <p:spPr>
-            <a:xfrm rot="0">
+            <a:xfrm>
               <a:off x="0" y="1405232"/>
               <a:ext cx="15384877" cy="695325"/>
             </a:xfrm>
@@ -5173,7 +5448,7 @@
             </a:prstGeom>
           </p:spPr>
           <p:txBody>
-            <a:bodyPr anchor="t" rtlCol="false" tIns="0" lIns="0" bIns="0" rIns="0">
+            <a:bodyPr lIns="0" tIns="0" rIns="0" bIns="0" rtlCol="0" anchor="t">
               <a:spAutoFit/>
             </a:bodyPr>
             <a:lstStyle/>
@@ -5205,13 +5480,14 @@
 </file>
 
 <file path=ppt/slides/slide8.xml><?xml version="1.0" encoding="utf-8"?>
-<p:sld xmlns:p="http://schemas.openxmlformats.org/presentationml/2006/main" xmlns:a="http://schemas.openxmlformats.org/drawingml/2006/main" xmlns:r="http://schemas.openxmlformats.org/officeDocument/2006/relationships">
+<p:sld xmlns:a="http://schemas.openxmlformats.org/drawingml/2006/main" xmlns:r="http://schemas.openxmlformats.org/officeDocument/2006/relationships" xmlns:p="http://schemas.openxmlformats.org/presentationml/2006/main">
   <p:cSld>
     <p:bg>
       <p:bgPr>
         <a:solidFill>
           <a:srgbClr val="1E3D58"/>
         </a:solidFill>
+        <a:effectLst/>
       </p:bgPr>
     </p:bg>
     <p:spTree>
@@ -5230,12 +5506,12 @@
       </p:grpSpPr>
       <p:grpSp>
         <p:nvGrpSpPr>
-          <p:cNvPr name="Group 2" id="2"/>
+          <p:cNvPr id="2" name="Group 2"/>
           <p:cNvGrpSpPr/>
           <p:nvPr/>
         </p:nvGrpSpPr>
         <p:grpSpPr>
-          <a:xfrm rot="0">
+          <a:xfrm>
             <a:off x="0" y="8832603"/>
             <a:ext cx="2886906" cy="851395"/>
             <a:chOff x="0" y="0"/>
@@ -5244,7 +5520,7 @@
         </p:grpSpPr>
         <p:sp>
           <p:nvSpPr>
-            <p:cNvPr name="Freeform 3" id="3"/>
+            <p:cNvPr id="3" name="Freeform 3"/>
             <p:cNvSpPr/>
             <p:nvPr/>
           </p:nvSpPr>
@@ -5258,9 +5534,9 @@
               <a:gdLst/>
               <a:ahLst/>
               <a:cxnLst/>
-              <a:rect r="r" b="b" t="t" l="l"/>
+              <a:rect l="l" t="t" r="r" b="b"/>
               <a:pathLst>
-                <a:path h="408940" w="1722525">
+                <a:path w="1722525" h="408940">
                   <a:moveTo>
                     <a:pt x="1516785" y="0"/>
                   </a:moveTo>
@@ -5305,7 +5581,7 @@
       </p:grpSp>
       <p:grpSp>
         <p:nvGrpSpPr>
-          <p:cNvPr name="Group 4" id="4"/>
+          <p:cNvPr id="4" name="Group 4"/>
           <p:cNvGrpSpPr/>
           <p:nvPr/>
         </p:nvGrpSpPr>
@@ -5319,7 +5595,7 @@
         </p:grpSpPr>
         <p:sp>
           <p:nvSpPr>
-            <p:cNvPr name="Freeform 5" id="5"/>
+            <p:cNvPr id="5" name="Freeform 5"/>
             <p:cNvSpPr/>
             <p:nvPr/>
           </p:nvSpPr>
@@ -5333,9 +5609,9 @@
               <a:gdLst/>
               <a:ahLst/>
               <a:cxnLst/>
-              <a:rect r="r" b="b" t="t" l="l"/>
+              <a:rect l="l" t="t" r="r" b="b"/>
               <a:pathLst>
-                <a:path h="408940" w="1722525">
+                <a:path w="1722525" h="408940">
                   <a:moveTo>
                     <a:pt x="1516785" y="0"/>
                   </a:moveTo>
@@ -5380,21 +5656,21 @@
       </p:grpSp>
       <p:pic>
         <p:nvPicPr>
-          <p:cNvPr name="Picture 6" id="6"/>
+          <p:cNvPr id="6" name="Picture 6"/>
           <p:cNvPicPr>
-            <a:picLocks noChangeAspect="true"/>
+            <a:picLocks noChangeAspect="1"/>
           </p:cNvPicPr>
           <p:nvPr/>
         </p:nvPicPr>
         <p:blipFill>
           <a:blip r:embed="rId2"/>
-          <a:srcRect l="0" t="0" r="0" b="0"/>
+          <a:srcRect/>
           <a:stretch>
             <a:fillRect/>
           </a:stretch>
         </p:blipFill>
         <p:spPr>
-          <a:xfrm flipH="false" flipV="false" rot="0">
+          <a:xfrm>
             <a:off x="3324152" y="3393831"/>
             <a:ext cx="11639697" cy="5864469"/>
           </a:xfrm>
@@ -5405,12 +5681,12 @@
       </p:pic>
       <p:grpSp>
         <p:nvGrpSpPr>
-          <p:cNvPr name="Group 7" id="7"/>
+          <p:cNvPr id="7" name="Group 7"/>
           <p:cNvGrpSpPr/>
           <p:nvPr/>
         </p:nvGrpSpPr>
         <p:grpSpPr>
-          <a:xfrm rot="0">
+          <a:xfrm>
             <a:off x="1251372" y="1028700"/>
             <a:ext cx="11538658" cy="1575417"/>
             <a:chOff x="0" y="0"/>
@@ -5419,12 +5695,12 @@
         </p:grpSpPr>
         <p:sp>
           <p:nvSpPr>
-            <p:cNvPr name="TextBox 8" id="8"/>
-            <p:cNvSpPr txBox="true"/>
+            <p:cNvPr id="8" name="TextBox 8"/>
+            <p:cNvSpPr txBox="1"/>
             <p:nvPr/>
           </p:nvSpPr>
           <p:spPr>
-            <a:xfrm rot="0">
+            <a:xfrm>
               <a:off x="0" y="-66675"/>
               <a:ext cx="15384877" cy="1183428"/>
             </a:xfrm>
@@ -5433,7 +5709,7 @@
             </a:prstGeom>
           </p:spPr>
           <p:txBody>
-            <a:bodyPr anchor="t" rtlCol="false" tIns="0" lIns="0" bIns="0" rIns="0">
+            <a:bodyPr lIns="0" tIns="0" rIns="0" bIns="0" rtlCol="0" anchor="t">
               <a:spAutoFit/>
             </a:bodyPr>
             <a:lstStyle/>
@@ -5457,12 +5733,12 @@
         </p:sp>
         <p:sp>
           <p:nvSpPr>
-            <p:cNvPr name="TextBox 9" id="9"/>
-            <p:cNvSpPr txBox="true"/>
+            <p:cNvPr id="9" name="TextBox 9"/>
+            <p:cNvSpPr txBox="1"/>
             <p:nvPr/>
           </p:nvSpPr>
           <p:spPr>
-            <a:xfrm rot="0">
+            <a:xfrm>
               <a:off x="0" y="1405232"/>
               <a:ext cx="15384877" cy="695325"/>
             </a:xfrm>
@@ -5471,7 +5747,7 @@
             </a:prstGeom>
           </p:spPr>
           <p:txBody>
-            <a:bodyPr anchor="t" rtlCol="false" tIns="0" lIns="0" bIns="0" rIns="0">
+            <a:bodyPr lIns="0" tIns="0" rIns="0" bIns="0" rtlCol="0" anchor="t">
               <a:spAutoFit/>
             </a:bodyPr>
             <a:lstStyle/>
@@ -5503,13 +5779,14 @@
 </file>
 
 <file path=ppt/slides/slide9.xml><?xml version="1.0" encoding="utf-8"?>
-<p:sld xmlns:p="http://schemas.openxmlformats.org/presentationml/2006/main" xmlns:a="http://schemas.openxmlformats.org/drawingml/2006/main" xmlns:r="http://schemas.openxmlformats.org/officeDocument/2006/relationships">
+<p:sld xmlns:a="http://schemas.openxmlformats.org/drawingml/2006/main" xmlns:r="http://schemas.openxmlformats.org/officeDocument/2006/relationships" xmlns:p="http://schemas.openxmlformats.org/presentationml/2006/main">
   <p:cSld>
     <p:bg>
       <p:bgPr>
         <a:solidFill>
           <a:srgbClr val="1E3D58"/>
         </a:solidFill>
+        <a:effectLst/>
       </p:bgPr>
     </p:bg>
     <p:spTree>
@@ -5528,12 +5805,12 @@
       </p:grpSpPr>
       <p:grpSp>
         <p:nvGrpSpPr>
-          <p:cNvPr name="Group 2" id="2"/>
+          <p:cNvPr id="2" name="Group 2"/>
           <p:cNvGrpSpPr/>
           <p:nvPr/>
         </p:nvGrpSpPr>
         <p:grpSpPr>
-          <a:xfrm rot="0">
+          <a:xfrm>
             <a:off x="0" y="8832603"/>
             <a:ext cx="2886906" cy="851395"/>
             <a:chOff x="0" y="0"/>
@@ -5542,7 +5819,7 @@
         </p:grpSpPr>
         <p:sp>
           <p:nvSpPr>
-            <p:cNvPr name="Freeform 3" id="3"/>
+            <p:cNvPr id="3" name="Freeform 3"/>
             <p:cNvSpPr/>
             <p:nvPr/>
           </p:nvSpPr>
@@ -5556,9 +5833,9 @@
               <a:gdLst/>
               <a:ahLst/>
               <a:cxnLst/>
-              <a:rect r="r" b="b" t="t" l="l"/>
+              <a:rect l="l" t="t" r="r" b="b"/>
               <a:pathLst>
-                <a:path h="408940" w="1722525">
+                <a:path w="1722525" h="408940">
                   <a:moveTo>
                     <a:pt x="1516785" y="0"/>
                   </a:moveTo>
@@ -5603,7 +5880,7 @@
       </p:grpSp>
       <p:grpSp>
         <p:nvGrpSpPr>
-          <p:cNvPr name="Group 4" id="4"/>
+          <p:cNvPr id="4" name="Group 4"/>
           <p:cNvGrpSpPr/>
           <p:nvPr/>
         </p:nvGrpSpPr>
@@ -5617,7 +5894,7 @@
         </p:grpSpPr>
         <p:sp>
           <p:nvSpPr>
-            <p:cNvPr name="Freeform 5" id="5"/>
+            <p:cNvPr id="5" name="Freeform 5"/>
             <p:cNvSpPr/>
             <p:nvPr/>
           </p:nvSpPr>
@@ -5631,9 +5908,9 @@
               <a:gdLst/>
               <a:ahLst/>
               <a:cxnLst/>
-              <a:rect r="r" b="b" t="t" l="l"/>
+              <a:rect l="l" t="t" r="r" b="b"/>
               <a:pathLst>
-                <a:path h="408940" w="1722525">
+                <a:path w="1722525" h="408940">
                   <a:moveTo>
                     <a:pt x="1516785" y="0"/>
                   </a:moveTo>
@@ -5678,21 +5955,21 @@
       </p:grpSp>
       <p:pic>
         <p:nvPicPr>
-          <p:cNvPr name="Picture 6" id="6"/>
+          <p:cNvPr id="6" name="Picture 6"/>
           <p:cNvPicPr>
-            <a:picLocks noChangeAspect="true"/>
+            <a:picLocks noChangeAspect="1"/>
           </p:cNvPicPr>
           <p:nvPr/>
         </p:nvPicPr>
         <p:blipFill>
           <a:blip r:embed="rId2"/>
-          <a:srcRect l="0" t="0" r="0" b="0"/>
+          <a:srcRect/>
           <a:stretch>
             <a:fillRect/>
           </a:stretch>
         </p:blipFill>
         <p:spPr>
-          <a:xfrm flipH="false" flipV="false" rot="0">
+          <a:xfrm>
             <a:off x="3342782" y="3676857"/>
             <a:ext cx="11602435" cy="3957720"/>
           </a:xfrm>
@@ -5703,12 +5980,12 @@
       </p:pic>
       <p:grpSp>
         <p:nvGrpSpPr>
-          <p:cNvPr name="Group 7" id="7"/>
+          <p:cNvPr id="7" name="Group 7"/>
           <p:cNvGrpSpPr/>
           <p:nvPr/>
         </p:nvGrpSpPr>
         <p:grpSpPr>
-          <a:xfrm rot="0">
+          <a:xfrm>
             <a:off x="1251372" y="1028700"/>
             <a:ext cx="11538658" cy="1575417"/>
             <a:chOff x="0" y="0"/>
@@ -5717,12 +5994,12 @@
         </p:grpSpPr>
         <p:sp>
           <p:nvSpPr>
-            <p:cNvPr name="TextBox 8" id="8"/>
-            <p:cNvSpPr txBox="true"/>
+            <p:cNvPr id="8" name="TextBox 8"/>
+            <p:cNvSpPr txBox="1"/>
             <p:nvPr/>
           </p:nvSpPr>
           <p:spPr>
-            <a:xfrm rot="0">
+            <a:xfrm>
               <a:off x="0" y="-66675"/>
               <a:ext cx="15384877" cy="1183428"/>
             </a:xfrm>
@@ -5731,7 +6008,7 @@
             </a:prstGeom>
           </p:spPr>
           <p:txBody>
-            <a:bodyPr anchor="t" rtlCol="false" tIns="0" lIns="0" bIns="0" rIns="0">
+            <a:bodyPr lIns="0" tIns="0" rIns="0" bIns="0" rtlCol="0" anchor="t">
               <a:spAutoFit/>
             </a:bodyPr>
             <a:lstStyle/>
@@ -5755,12 +6032,12 @@
         </p:sp>
         <p:sp>
           <p:nvSpPr>
-            <p:cNvPr name="TextBox 9" id="9"/>
-            <p:cNvSpPr txBox="true"/>
+            <p:cNvPr id="9" name="TextBox 9"/>
+            <p:cNvSpPr txBox="1"/>
             <p:nvPr/>
           </p:nvSpPr>
           <p:spPr>
-            <a:xfrm rot="0">
+            <a:xfrm>
               <a:off x="0" y="1405232"/>
               <a:ext cx="15384877" cy="695325"/>
             </a:xfrm>
@@ -5769,7 +6046,7 @@
             </a:prstGeom>
           </p:spPr>
           <p:txBody>
-            <a:bodyPr anchor="t" rtlCol="false" tIns="0" lIns="0" bIns="0" rIns="0">
+            <a:bodyPr lIns="0" tIns="0" rIns="0" bIns="0" rtlCol="0" anchor="t">
               <a:spAutoFit/>
             </a:bodyPr>
             <a:lstStyle/>

</xml_diff>